<commit_message>
Updates to Slides and calculations
</commit_message>
<xml_diff>
--- a/Presentations/Mid Semester Review/Individual_Slides/Tyler/Slide template.pptx
+++ b/Presentations/Mid Semester Review/Individual_Slides/Tyler/Slide template.pptx
@@ -5,7 +5,7 @@
     <p:sldMasterId id="2147483648" r:id="rId1"/>
   </p:sldMasterIdLst>
   <p:notesMasterIdLst>
-    <p:notesMasterId r:id="rId7"/>
+    <p:notesMasterId r:id="rId8"/>
   </p:notesMasterIdLst>
   <p:sldIdLst>
     <p:sldId id="260" r:id="rId2"/>
@@ -13,6 +13,7 @@
     <p:sldId id="258" r:id="rId4"/>
     <p:sldId id="256" r:id="rId5"/>
     <p:sldId id="259" r:id="rId6"/>
+    <p:sldId id="261" r:id="rId7"/>
   </p:sldIdLst>
   <p:sldSz cx="9144000" cy="6858000" type="screen4x3"/>
   <p:notesSz cx="6858000" cy="9144000"/>
@@ -196,7 +197,7 @@
           <a:p>
             <a:fld id="{51E4185F-0EA7-4BA8-A08E-5754056CFC72}" type="datetimeFigureOut">
               <a:rPr lang="en-US" smtClean="0"/>
-              <a:t>10/14/2015</a:t>
+              <a:t>10/19/2015</a:t>
             </a:fld>
             <a:endParaRPr lang="en-US"/>
           </a:p>
@@ -729,7 +730,7 @@
           <a:p>
             <a:fld id="{A8193F1D-56DB-E44D-9849-55B52730CCEA}" type="datetimeFigureOut">
               <a:rPr lang="en-US" smtClean="0"/>
-              <a:t>10/14/2015</a:t>
+              <a:t>10/19/2015</a:t>
             </a:fld>
             <a:endParaRPr lang="en-US"/>
           </a:p>
@@ -899,7 +900,7 @@
           <a:p>
             <a:fld id="{A8193F1D-56DB-E44D-9849-55B52730CCEA}" type="datetimeFigureOut">
               <a:rPr lang="en-US" smtClean="0"/>
-              <a:t>10/14/2015</a:t>
+              <a:t>10/19/2015</a:t>
             </a:fld>
             <a:endParaRPr lang="en-US"/>
           </a:p>
@@ -1079,7 +1080,7 @@
           <a:p>
             <a:fld id="{A8193F1D-56DB-E44D-9849-55B52730CCEA}" type="datetimeFigureOut">
               <a:rPr lang="en-US" smtClean="0"/>
-              <a:t>10/14/2015</a:t>
+              <a:t>10/19/2015</a:t>
             </a:fld>
             <a:endParaRPr lang="en-US"/>
           </a:p>
@@ -1249,7 +1250,7 @@
           <a:p>
             <a:fld id="{A8193F1D-56DB-E44D-9849-55B52730CCEA}" type="datetimeFigureOut">
               <a:rPr lang="en-US" smtClean="0"/>
-              <a:t>10/14/2015</a:t>
+              <a:t>10/19/2015</a:t>
             </a:fld>
             <a:endParaRPr lang="en-US"/>
           </a:p>
@@ -1495,7 +1496,7 @@
           <a:p>
             <a:fld id="{A8193F1D-56DB-E44D-9849-55B52730CCEA}" type="datetimeFigureOut">
               <a:rPr lang="en-US" smtClean="0"/>
-              <a:t>10/14/2015</a:t>
+              <a:t>10/19/2015</a:t>
             </a:fld>
             <a:endParaRPr lang="en-US"/>
           </a:p>
@@ -1783,7 +1784,7 @@
           <a:p>
             <a:fld id="{A8193F1D-56DB-E44D-9849-55B52730CCEA}" type="datetimeFigureOut">
               <a:rPr lang="en-US" smtClean="0"/>
-              <a:t>10/14/2015</a:t>
+              <a:t>10/19/2015</a:t>
             </a:fld>
             <a:endParaRPr lang="en-US"/>
           </a:p>
@@ -2205,7 +2206,7 @@
           <a:p>
             <a:fld id="{A8193F1D-56DB-E44D-9849-55B52730CCEA}" type="datetimeFigureOut">
               <a:rPr lang="en-US" smtClean="0"/>
-              <a:t>10/14/2015</a:t>
+              <a:t>10/19/2015</a:t>
             </a:fld>
             <a:endParaRPr lang="en-US"/>
           </a:p>
@@ -2323,7 +2324,7 @@
           <a:p>
             <a:fld id="{A8193F1D-56DB-E44D-9849-55B52730CCEA}" type="datetimeFigureOut">
               <a:rPr lang="en-US" smtClean="0"/>
-              <a:t>10/14/2015</a:t>
+              <a:t>10/19/2015</a:t>
             </a:fld>
             <a:endParaRPr lang="en-US"/>
           </a:p>
@@ -2418,7 +2419,7 @@
           <a:p>
             <a:fld id="{A8193F1D-56DB-E44D-9849-55B52730CCEA}" type="datetimeFigureOut">
               <a:rPr lang="en-US" smtClean="0"/>
-              <a:t>10/14/2015</a:t>
+              <a:t>10/19/2015</a:t>
             </a:fld>
             <a:endParaRPr lang="en-US"/>
           </a:p>
@@ -2695,7 +2696,7 @@
           <a:p>
             <a:fld id="{A8193F1D-56DB-E44D-9849-55B52730CCEA}" type="datetimeFigureOut">
               <a:rPr lang="en-US" smtClean="0"/>
-              <a:t>10/14/2015</a:t>
+              <a:t>10/19/2015</a:t>
             </a:fld>
             <a:endParaRPr lang="en-US"/>
           </a:p>
@@ -2948,7 +2949,7 @@
           <a:p>
             <a:fld id="{A8193F1D-56DB-E44D-9849-55B52730CCEA}" type="datetimeFigureOut">
               <a:rPr lang="en-US" smtClean="0"/>
-              <a:t>10/14/2015</a:t>
+              <a:t>10/19/2015</a:t>
             </a:fld>
             <a:endParaRPr lang="en-US"/>
           </a:p>
@@ -3161,7 +3162,7 @@
           <a:p>
             <a:fld id="{A8193F1D-56DB-E44D-9849-55B52730CCEA}" type="datetimeFigureOut">
               <a:rPr lang="en-US" smtClean="0"/>
-              <a:t>10/14/2015</a:t>
+              <a:t>10/19/2015</a:t>
             </a:fld>
             <a:endParaRPr lang="en-US"/>
           </a:p>
@@ -6343,7 +6344,7 @@
       </p:grpSp>
       <p:pic>
         <p:nvPicPr>
-          <p:cNvPr id="2" name="Picture 1"/>
+          <p:cNvPr id="3" name="Picture 2"/>
           <p:cNvPicPr>
             <a:picLocks noChangeAspect="1"/>
           </p:cNvPicPr>
@@ -6363,8 +6364,8 @@
         </p:blipFill>
         <p:spPr>
           <a:xfrm>
-            <a:off x="891265" y="986786"/>
-            <a:ext cx="7604786" cy="5492345"/>
+            <a:off x="1019619" y="1256648"/>
+            <a:ext cx="7104762" cy="5514286"/>
           </a:xfrm>
           <a:prstGeom prst="rect">
             <a:avLst/>
@@ -6615,7 +6616,7 @@
       </p:grpSp>
       <p:pic>
         <p:nvPicPr>
-          <p:cNvPr id="10" name="Picture 9"/>
+          <p:cNvPr id="3" name="Picture 2"/>
           <p:cNvPicPr>
             <a:picLocks noChangeAspect="1"/>
           </p:cNvPicPr>
@@ -6635,38 +6636,8 @@
         </p:blipFill>
         <p:spPr>
           <a:xfrm>
-            <a:off x="1434822" y="1021190"/>
-            <a:ext cx="6876191" cy="5333334"/>
-          </a:xfrm>
-          <a:prstGeom prst="rect">
-            <a:avLst/>
-          </a:prstGeom>
-        </p:spPr>
-      </p:pic>
-      <p:pic>
-        <p:nvPicPr>
-          <p:cNvPr id="2" name="Picture 1"/>
-          <p:cNvPicPr>
-            <a:picLocks noChangeAspect="1"/>
-          </p:cNvPicPr>
-          <p:nvPr/>
-        </p:nvPicPr>
-        <p:blipFill>
-          <a:blip r:embed="rId5">
-            <a:extLst>
-              <a:ext uri="{28A0092B-C50C-407E-A947-70E740481C1C}">
-                <a14:useLocalDpi xmlns:a14="http://schemas.microsoft.com/office/drawing/2010/main" val="0"/>
-              </a:ext>
-            </a:extLst>
-          </a:blip>
-          <a:stretch>
-            <a:fillRect/>
-          </a:stretch>
-        </p:blipFill>
-        <p:spPr>
-          <a:xfrm>
-            <a:off x="1043056" y="1021190"/>
-            <a:ext cx="7301204" cy="5536374"/>
+            <a:off x="1205333" y="1136563"/>
+            <a:ext cx="6733334" cy="5095238"/>
           </a:xfrm>
           <a:prstGeom prst="rect">
             <a:avLst/>
@@ -6944,7 +6915,7 @@
           <p:nvPr>
             <p:extLst>
               <p:ext uri="{D42A27DB-BD31-4B8C-83A1-F6EECF244321}">
-                <p14:modId xmlns:p14="http://schemas.microsoft.com/office/powerpoint/2010/main" val="1522211517"/>
+                <p14:modId xmlns:p14="http://schemas.microsoft.com/office/powerpoint/2010/main" val="3168648641"/>
               </p:ext>
             </p:extLst>
           </p:nvPr>
@@ -7003,11 +6974,7 @@
                       <a:pPr algn="ctr"/>
                       <a:r>
                         <a:rPr lang="en-US" dirty="0" smtClean="0"/>
-                        <a:t> </a:t>
-                      </a:r>
-                      <a:r>
-                        <a:rPr lang="en-US" dirty="0" smtClean="0"/>
-                        <a:t>[kg]</a:t>
+                        <a:t> [kg]</a:t>
                       </a:r>
                       <a:endParaRPr lang="en-US" dirty="0"/>
                     </a:p>
@@ -7041,11 +7008,7 @@
                       <a:pPr algn="ctr"/>
                       <a:r>
                         <a:rPr lang="en-US" baseline="0" dirty="0" smtClean="0"/>
-                        <a:t>Endurance w/ 1lb PL </a:t>
-                      </a:r>
-                      <a:r>
-                        <a:rPr lang="en-US" baseline="0" dirty="0" smtClean="0"/>
-                        <a:t>[min]</a:t>
+                        <a:t>Endurance w/ 1lb PL [min]</a:t>
                       </a:r>
                       <a:endParaRPr lang="en-US" dirty="0"/>
                     </a:p>
@@ -7092,7 +7055,7 @@
                       <a:pPr algn="ctr"/>
                       <a:r>
                         <a:rPr lang="en-US" dirty="0" smtClean="0"/>
-                        <a:t>15.2</a:t>
+                        <a:t>13.7</a:t>
                       </a:r>
                       <a:endParaRPr lang="en-US" dirty="0"/>
                     </a:p>
@@ -7107,7 +7070,7 @@
                       <a:pPr algn="ctr"/>
                       <a:r>
                         <a:rPr lang="en-US" dirty="0" smtClean="0"/>
-                        <a:t>12.3</a:t>
+                        <a:t>11.1</a:t>
                       </a:r>
                       <a:endParaRPr lang="en-US" dirty="0"/>
                     </a:p>
@@ -7162,7 +7125,7 @@
                       <a:pPr algn="ctr"/>
                       <a:r>
                         <a:rPr lang="en-US" dirty="0" smtClean="0"/>
-                        <a:t>12.4</a:t>
+                        <a:t>11.3</a:t>
                       </a:r>
                       <a:endParaRPr lang="en-US" dirty="0"/>
                     </a:p>
@@ -7177,7 +7140,7 @@
                       <a:pPr algn="ctr"/>
                       <a:r>
                         <a:rPr lang="en-US" dirty="0" smtClean="0"/>
-                        <a:t>9.3</a:t>
+                        <a:t>8.4</a:t>
                       </a:r>
                       <a:endParaRPr lang="en-US" dirty="0"/>
                     </a:p>
@@ -7232,7 +7195,7 @@
                       <a:pPr algn="ctr"/>
                       <a:r>
                         <a:rPr lang="en-US" dirty="0" smtClean="0"/>
-                        <a:t>12.6</a:t>
+                        <a:t>11.4</a:t>
                       </a:r>
                       <a:endParaRPr lang="en-US" dirty="0"/>
                     </a:p>
@@ -7247,7 +7210,7 @@
                       <a:pPr algn="ctr"/>
                       <a:r>
                         <a:rPr lang="en-US" dirty="0" smtClean="0"/>
-                        <a:t>9.4</a:t>
+                        <a:t>8.5</a:t>
                       </a:r>
                       <a:endParaRPr lang="en-US" dirty="0"/>
                     </a:p>
@@ -8313,6 +8276,1423 @@
         <p:cTn id="1" dur="indefinite" restart="never" nodeType="tmRoot"/>
       </p:par>
     </p:tnLst>
+  </p:timing>
+</p:sld>
+</file>
+
+<file path=ppt/slides/slide6.xml><?xml version="1.0" encoding="utf-8"?>
+<p:sld xmlns:a="http://schemas.openxmlformats.org/drawingml/2006/main" xmlns:r="http://schemas.openxmlformats.org/officeDocument/2006/relationships" xmlns:p="http://schemas.openxmlformats.org/presentationml/2006/main">
+  <p:cSld>
+    <p:spTree>
+      <p:nvGrpSpPr>
+        <p:cNvPr id="1" name=""/>
+        <p:cNvGrpSpPr/>
+        <p:nvPr/>
+      </p:nvGrpSpPr>
+      <p:grpSpPr>
+        <a:xfrm>
+          <a:off x="0" y="0"/>
+          <a:ext cx="0" cy="0"/>
+          <a:chOff x="0" y="0"/>
+          <a:chExt cx="0" cy="0"/>
+        </a:xfrm>
+      </p:grpSpPr>
+      <p:grpSp>
+        <p:nvGrpSpPr>
+          <p:cNvPr id="4" name="Group 3"/>
+          <p:cNvGrpSpPr/>
+          <p:nvPr/>
+        </p:nvGrpSpPr>
+        <p:grpSpPr>
+          <a:xfrm>
+            <a:off x="0" y="1"/>
+            <a:ext cx="9144000" cy="844012"/>
+            <a:chOff x="0" y="1"/>
+            <a:chExt cx="9144000" cy="844012"/>
+          </a:xfrm>
+        </p:grpSpPr>
+        <p:cxnSp>
+          <p:nvCxnSpPr>
+            <p:cNvPr id="5" name="Straight Connector 4"/>
+            <p:cNvCxnSpPr/>
+            <p:nvPr/>
+          </p:nvCxnSpPr>
+          <p:spPr>
+            <a:xfrm>
+              <a:off x="0" y="844013"/>
+              <a:ext cx="9144000" cy="0"/>
+            </a:xfrm>
+            <a:prstGeom prst="line">
+              <a:avLst/>
+            </a:prstGeom>
+            <a:ln>
+              <a:solidFill>
+                <a:schemeClr val="tx1"/>
+              </a:solidFill>
+            </a:ln>
+            <a:effectLst/>
+          </p:spPr>
+          <p:style>
+            <a:lnRef idx="2">
+              <a:schemeClr val="accent1"/>
+            </a:lnRef>
+            <a:fillRef idx="0">
+              <a:schemeClr val="accent1"/>
+            </a:fillRef>
+            <a:effectRef idx="1">
+              <a:schemeClr val="accent1"/>
+            </a:effectRef>
+            <a:fontRef idx="minor">
+              <a:schemeClr val="tx1"/>
+            </a:fontRef>
+          </p:style>
+        </p:cxnSp>
+        <p:pic>
+          <p:nvPicPr>
+            <p:cNvPr id="6" name="Picture 5" descr="Screen Shot 2015-10-11 at 11.16.20 AM.png"/>
+            <p:cNvPicPr>
+              <a:picLocks noChangeAspect="1"/>
+            </p:cNvPicPr>
+            <p:nvPr/>
+          </p:nvPicPr>
+          <p:blipFill>
+            <a:blip r:embed="rId2">
+              <a:extLst>
+                <a:ext uri="{28A0092B-C50C-407E-A947-70E740481C1C}">
+                  <a14:useLocalDpi xmlns:a14="http://schemas.microsoft.com/office/drawing/2010/main" val="0"/>
+                </a:ext>
+              </a:extLst>
+            </a:blip>
+            <a:stretch>
+              <a:fillRect/>
+            </a:stretch>
+          </p:blipFill>
+          <p:spPr>
+            <a:xfrm>
+              <a:off x="0" y="1"/>
+              <a:ext cx="1151748" cy="844012"/>
+            </a:xfrm>
+            <a:prstGeom prst="rect">
+              <a:avLst/>
+            </a:prstGeom>
+          </p:spPr>
+        </p:pic>
+        <p:sp>
+          <p:nvSpPr>
+            <p:cNvPr id="7" name="Rectangle 6"/>
+            <p:cNvSpPr/>
+            <p:nvPr/>
+          </p:nvSpPr>
+          <p:spPr>
+            <a:xfrm>
+              <a:off x="1151748" y="2283"/>
+              <a:ext cx="7992252" cy="832104"/>
+            </a:xfrm>
+            <a:prstGeom prst="rect">
+              <a:avLst/>
+            </a:prstGeom>
+            <a:solidFill>
+              <a:schemeClr val="tx1"/>
+            </a:solidFill>
+            <a:ln>
+              <a:solidFill>
+                <a:schemeClr val="tx1"/>
+              </a:solidFill>
+            </a:ln>
+            <a:effectLst/>
+          </p:spPr>
+          <p:style>
+            <a:lnRef idx="1">
+              <a:schemeClr val="accent1"/>
+            </a:lnRef>
+            <a:fillRef idx="3">
+              <a:schemeClr val="accent1"/>
+            </a:fillRef>
+            <a:effectRef idx="2">
+              <a:schemeClr val="accent1"/>
+            </a:effectRef>
+            <a:fontRef idx="minor">
+              <a:schemeClr val="lt1"/>
+            </a:fontRef>
+          </p:style>
+          <p:txBody>
+            <a:bodyPr rtlCol="0" anchor="ctr"/>
+            <a:lstStyle/>
+            <a:p>
+              <a:pPr algn="ctr"/>
+              <a:endParaRPr lang="en-US"/>
+            </a:p>
+          </p:txBody>
+        </p:sp>
+        <p:pic>
+          <p:nvPicPr>
+            <p:cNvPr id="8" name="Picture 7"/>
+            <p:cNvPicPr>
+              <a:picLocks noChangeAspect="1"/>
+            </p:cNvPicPr>
+            <p:nvPr/>
+          </p:nvPicPr>
+          <p:blipFill>
+            <a:blip r:embed="rId3"/>
+            <a:stretch>
+              <a:fillRect/>
+            </a:stretch>
+          </p:blipFill>
+          <p:spPr>
+            <a:xfrm>
+              <a:off x="8311013" y="2283"/>
+              <a:ext cx="832987" cy="832987"/>
+            </a:xfrm>
+            <a:prstGeom prst="rect">
+              <a:avLst/>
+            </a:prstGeom>
+          </p:spPr>
+        </p:pic>
+        <p:sp>
+          <p:nvSpPr>
+            <p:cNvPr id="9" name="TextBox 8"/>
+            <p:cNvSpPr txBox="1"/>
+            <p:nvPr/>
+          </p:nvSpPr>
+          <p:spPr>
+            <a:xfrm>
+              <a:off x="1202040" y="188621"/>
+              <a:ext cx="6983237" cy="461665"/>
+            </a:xfrm>
+            <a:prstGeom prst="rect">
+              <a:avLst/>
+            </a:prstGeom>
+            <a:noFill/>
+          </p:spPr>
+          <p:txBody>
+            <a:bodyPr wrap="square" rtlCol="0">
+              <a:spAutoFit/>
+            </a:bodyPr>
+            <a:lstStyle/>
+            <a:p>
+              <a:pPr algn="ctr"/>
+              <a:r>
+                <a:rPr lang="en-US" sz="2400" dirty="0" smtClean="0">
+                  <a:solidFill>
+                    <a:srgbClr val="FFFFFF"/>
+                  </a:solidFill>
+                  <a:latin typeface="Candara"/>
+                  <a:cs typeface="Candara"/>
+                </a:rPr>
+                <a:t>Motor Current Draw</a:t>
+              </a:r>
+              <a:endParaRPr lang="en-US" sz="2400" dirty="0">
+                <a:solidFill>
+                  <a:srgbClr val="FFFFFF"/>
+                </a:solidFill>
+                <a:latin typeface="Candara"/>
+                <a:cs typeface="Candara"/>
+              </a:endParaRPr>
+            </a:p>
+          </p:txBody>
+        </p:sp>
+      </p:grpSp>
+      <mc:AlternateContent xmlns:mc="http://schemas.openxmlformats.org/markup-compatibility/2006">
+        <mc:Choice xmlns:a14="http://schemas.microsoft.com/office/drawing/2010/main" Requires="a14">
+          <p:sp>
+            <p:nvSpPr>
+              <p:cNvPr id="3" name="TextBox 2"/>
+              <p:cNvSpPr txBox="1"/>
+              <p:nvPr/>
+            </p:nvSpPr>
+            <p:spPr>
+              <a:xfrm>
+                <a:off x="669851" y="1483955"/>
+                <a:ext cx="2902689" cy="4363952"/>
+              </a:xfrm>
+              <a:prstGeom prst="rect">
+                <a:avLst/>
+              </a:prstGeom>
+              <a:noFill/>
+            </p:spPr>
+            <p:txBody>
+              <a:bodyPr wrap="square" rtlCol="0">
+                <a:spAutoFit/>
+              </a:bodyPr>
+              <a:lstStyle/>
+              <a:p>
+                <a:pPr algn="ctr"/>
+                <a:r>
+                  <a:rPr lang="en-US" dirty="0"/>
+                  <a:t>Thrust per motor:</a:t>
+                </a:r>
+              </a:p>
+              <a:p>
+                <a:pPr algn="ctr"/>
+                <a:endParaRPr lang="en-US" b="0" dirty="0" smtClean="0">
+                  <a:latin typeface="Cambria Math"/>
+                </a:endParaRPr>
+              </a:p>
+              <a:p>
+                <a:pPr algn="ctr"/>
+                <a14:m>
+                  <m:oMathPara xmlns:m="http://schemas.openxmlformats.org/officeDocument/2006/math">
+                    <m:oMathParaPr>
+                      <m:jc m:val="centerGroup"/>
+                    </m:oMathParaPr>
+                    <m:oMath xmlns:m="http://schemas.openxmlformats.org/officeDocument/2006/math">
+                      <m:r>
+                        <a:rPr lang="en-US" b="0" i="1" smtClean="0">
+                          <a:latin typeface="Cambria Math"/>
+                        </a:rPr>
+                        <m:t>𝑇</m:t>
+                      </m:r>
+                      <m:r>
+                        <a:rPr lang="en-US" b="0" i="1" smtClean="0">
+                          <a:latin typeface="Cambria Math"/>
+                        </a:rPr>
+                        <m:t>=0.5 </m:t>
+                      </m:r>
+                      <m:r>
+                        <a:rPr lang="en-US" b="0" i="1" smtClean="0">
+                          <a:latin typeface="Cambria Math"/>
+                          <a:ea typeface="Cambria Math"/>
+                        </a:rPr>
+                        <m:t>𝜌</m:t>
+                      </m:r>
+                      <m:r>
+                        <a:rPr lang="en-US" b="0" i="1" smtClean="0">
+                          <a:latin typeface="Cambria Math"/>
+                          <a:ea typeface="Cambria Math"/>
+                        </a:rPr>
+                        <m:t>𝐴</m:t>
+                      </m:r>
+                      <m:sSup>
+                        <m:sSupPr>
+                          <m:ctrlPr>
+                            <a:rPr lang="en-US" b="0" i="1" smtClean="0">
+                              <a:latin typeface="Cambria Math"/>
+                              <a:ea typeface="Cambria Math"/>
+                            </a:rPr>
+                          </m:ctrlPr>
+                        </m:sSupPr>
+                        <m:e>
+                          <m:r>
+                            <a:rPr lang="en-US" b="0" i="1" smtClean="0">
+                              <a:latin typeface="Cambria Math"/>
+                              <a:ea typeface="Cambria Math"/>
+                            </a:rPr>
+                            <m:t>𝑣</m:t>
+                          </m:r>
+                        </m:e>
+                        <m:sup>
+                          <m:r>
+                            <a:rPr lang="en-US" b="0" i="1" smtClean="0">
+                              <a:latin typeface="Cambria Math"/>
+                              <a:ea typeface="Cambria Math"/>
+                            </a:rPr>
+                            <m:t>2</m:t>
+                          </m:r>
+                        </m:sup>
+                      </m:sSup>
+                    </m:oMath>
+                  </m:oMathPara>
+                </a14:m>
+                <a:endParaRPr lang="en-US" b="0" dirty="0" smtClean="0">
+                  <a:ea typeface="Cambria Math"/>
+                </a:endParaRPr>
+              </a:p>
+              <a:p>
+                <a:pPr algn="ctr"/>
+                <a:endParaRPr lang="en-US" dirty="0" smtClean="0"/>
+              </a:p>
+              <a:p>
+                <a:pPr algn="ctr"/>
+                <a:r>
+                  <a:rPr lang="en-US" dirty="0" smtClean="0"/>
+                  <a:t>For Hover:  Thrust = Weight</a:t>
+                </a:r>
+              </a:p>
+              <a:p>
+                <a:pPr algn="ctr"/>
+                <a:endParaRPr lang="en-US" dirty="0"/>
+              </a:p>
+              <a:p>
+                <a:pPr algn="ctr"/>
+                <a14:m>
+                  <m:oMathPara xmlns:m="http://schemas.openxmlformats.org/officeDocument/2006/math">
+                    <m:oMathParaPr>
+                      <m:jc m:val="centerGroup"/>
+                    </m:oMathParaPr>
+                    <m:oMath xmlns:m="http://schemas.openxmlformats.org/officeDocument/2006/math">
+                      <m:sSub>
+                        <m:sSubPr>
+                          <m:ctrlPr>
+                            <a:rPr lang="en-US" b="0" i="1" smtClean="0">
+                              <a:latin typeface="Cambria Math"/>
+                            </a:rPr>
+                          </m:ctrlPr>
+                        </m:sSubPr>
+                        <m:e>
+                          <m:r>
+                            <a:rPr lang="en-US" b="0" i="1" smtClean="0">
+                              <a:latin typeface="Cambria Math"/>
+                            </a:rPr>
+                            <m:t>𝑣</m:t>
+                          </m:r>
+                        </m:e>
+                        <m:sub>
+                          <m:r>
+                            <a:rPr lang="en-US" b="0" i="1" smtClean="0">
+                              <a:latin typeface="Cambria Math"/>
+                            </a:rPr>
+                            <m:t>h𝑜𝑣</m:t>
+                          </m:r>
+                        </m:sub>
+                      </m:sSub>
+                      <m:r>
+                        <a:rPr lang="en-US" b="0" i="1" smtClean="0">
+                          <a:latin typeface="Cambria Math"/>
+                        </a:rPr>
+                        <m:t>= </m:t>
+                      </m:r>
+                      <m:rad>
+                        <m:radPr>
+                          <m:degHide m:val="on"/>
+                          <m:ctrlPr>
+                            <a:rPr lang="en-US" i="1" smtClean="0">
+                              <a:latin typeface="Cambria Math"/>
+                            </a:rPr>
+                          </m:ctrlPr>
+                        </m:radPr>
+                        <m:deg/>
+                        <m:e>
+                          <m:f>
+                            <m:fPr>
+                              <m:ctrlPr>
+                                <a:rPr lang="en-US" i="1" smtClean="0">
+                                  <a:latin typeface="Cambria Math"/>
+                                </a:rPr>
+                              </m:ctrlPr>
+                            </m:fPr>
+                            <m:num>
+                              <m:r>
+                                <a:rPr lang="en-US" b="0" i="1" smtClean="0">
+                                  <a:latin typeface="Cambria Math"/>
+                                </a:rPr>
+                                <m:t>𝑚𝑔</m:t>
+                              </m:r>
+                            </m:num>
+                            <m:den>
+                              <m:r>
+                                <a:rPr lang="en-US" b="0" i="1" smtClean="0">
+                                  <a:latin typeface="Cambria Math"/>
+                                </a:rPr>
+                                <m:t>2</m:t>
+                              </m:r>
+                              <m:r>
+                                <a:rPr lang="en-US" b="0" i="1" smtClean="0">
+                                  <a:latin typeface="Cambria Math"/>
+                                  <a:ea typeface="Cambria Math"/>
+                                </a:rPr>
+                                <m:t>𝜌𝜋</m:t>
+                              </m:r>
+                              <m:sSup>
+                                <m:sSupPr>
+                                  <m:ctrlPr>
+                                    <a:rPr lang="en-US" b="0" i="1" smtClean="0">
+                                      <a:latin typeface="Cambria Math"/>
+                                      <a:ea typeface="Cambria Math"/>
+                                    </a:rPr>
+                                  </m:ctrlPr>
+                                </m:sSupPr>
+                                <m:e>
+                                  <m:r>
+                                    <a:rPr lang="en-US" b="0" i="1" smtClean="0">
+                                      <a:latin typeface="Cambria Math"/>
+                                      <a:ea typeface="Cambria Math"/>
+                                    </a:rPr>
+                                    <m:t>𝑟</m:t>
+                                  </m:r>
+                                </m:e>
+                                <m:sup>
+                                  <m:r>
+                                    <a:rPr lang="en-US" b="0" i="1" smtClean="0">
+                                      <a:latin typeface="Cambria Math"/>
+                                      <a:ea typeface="Cambria Math"/>
+                                    </a:rPr>
+                                    <m:t>2</m:t>
+                                  </m:r>
+                                </m:sup>
+                              </m:sSup>
+                            </m:den>
+                          </m:f>
+                        </m:e>
+                      </m:rad>
+                    </m:oMath>
+                  </m:oMathPara>
+                </a14:m>
+                <a:endParaRPr lang="en-US" dirty="0" smtClean="0"/>
+              </a:p>
+              <a:p>
+                <a:pPr algn="ctr"/>
+                <a:endParaRPr lang="en-US" dirty="0"/>
+              </a:p>
+              <a:p>
+                <a:pPr algn="ctr"/>
+                <a:r>
+                  <a:rPr lang="en-US" dirty="0" smtClean="0"/>
+                  <a:t>Relating Power</a:t>
+                </a:r>
+              </a:p>
+              <a:p>
+                <a:pPr algn="ctr"/>
+                <a14:m>
+                  <m:oMathPara xmlns:m="http://schemas.openxmlformats.org/officeDocument/2006/math">
+                    <m:oMathParaPr>
+                      <m:jc m:val="centerGroup"/>
+                    </m:oMathParaPr>
+                    <m:oMath xmlns:m="http://schemas.openxmlformats.org/officeDocument/2006/math">
+                      <m:r>
+                        <a:rPr lang="en-US" i="1">
+                          <a:latin typeface="Cambria Math"/>
+                        </a:rPr>
+                        <m:t>𝑃</m:t>
+                      </m:r>
+                      <m:r>
+                        <a:rPr lang="en-US" i="1">
+                          <a:latin typeface="Cambria Math"/>
+                        </a:rPr>
+                        <m:t>=</m:t>
+                      </m:r>
+                      <m:r>
+                        <a:rPr lang="en-US" i="1">
+                          <a:latin typeface="Cambria Math"/>
+                        </a:rPr>
+                        <m:t>𝑇𝑣</m:t>
+                      </m:r>
+                      <m:r>
+                        <a:rPr lang="en-US">
+                          <a:latin typeface="Cambria Math"/>
+                        </a:rPr>
+                        <m:t>=</m:t>
+                      </m:r>
+                      <m:r>
+                        <m:rPr>
+                          <m:sty m:val="p"/>
+                        </m:rPr>
+                        <a:rPr lang="en-US">
+                          <a:latin typeface="Cambria Math"/>
+                        </a:rPr>
+                        <m:t>IV</m:t>
+                      </m:r>
+                    </m:oMath>
+                  </m:oMathPara>
+                </a14:m>
+                <a:endParaRPr lang="en-US" dirty="0" smtClean="0"/>
+              </a:p>
+              <a:p>
+                <a:pPr algn="ctr"/>
+                <a:endParaRPr lang="en-US" dirty="0"/>
+              </a:p>
+              <a:p>
+                <a:pPr algn="ctr"/>
+                <a14:m>
+                  <m:oMathPara xmlns:m="http://schemas.openxmlformats.org/officeDocument/2006/math">
+                    <m:oMathParaPr>
+                      <m:jc m:val="centerGroup"/>
+                    </m:oMathParaPr>
+                    <m:oMath xmlns:m="http://schemas.openxmlformats.org/officeDocument/2006/math">
+                      <m:r>
+                        <a:rPr lang="en-US" b="0" i="1" smtClean="0">
+                          <a:latin typeface="Cambria Math"/>
+                        </a:rPr>
+                        <m:t>𝐼</m:t>
+                      </m:r>
+                      <m:r>
+                        <a:rPr lang="en-US" b="0" i="1" smtClean="0">
+                          <a:latin typeface="Cambria Math"/>
+                        </a:rPr>
+                        <m:t>= </m:t>
+                      </m:r>
+                      <m:f>
+                        <m:fPr>
+                          <m:ctrlPr>
+                            <a:rPr lang="en-US" b="0" i="1" smtClean="0">
+                              <a:latin typeface="Cambria Math"/>
+                            </a:rPr>
+                          </m:ctrlPr>
+                        </m:fPr>
+                        <m:num>
+                          <m:sSup>
+                            <m:sSupPr>
+                              <m:ctrlPr>
+                                <a:rPr lang="en-US" b="0" i="1" smtClean="0">
+                                  <a:latin typeface="Cambria Math"/>
+                                </a:rPr>
+                              </m:ctrlPr>
+                            </m:sSupPr>
+                            <m:e>
+                              <m:d>
+                                <m:dPr>
+                                  <m:ctrlPr>
+                                    <a:rPr lang="en-US" b="0" i="1" smtClean="0">
+                                      <a:latin typeface="Cambria Math"/>
+                                    </a:rPr>
+                                  </m:ctrlPr>
+                                </m:dPr>
+                                <m:e>
+                                  <m:r>
+                                    <a:rPr lang="en-US" b="0" i="1" smtClean="0">
+                                      <a:latin typeface="Cambria Math"/>
+                                    </a:rPr>
+                                    <m:t>𝑚𝑔</m:t>
+                                  </m:r>
+                                </m:e>
+                              </m:d>
+                            </m:e>
+                            <m:sup>
+                              <m:r>
+                                <a:rPr lang="en-US" b="0" i="1" smtClean="0">
+                                  <a:latin typeface="Cambria Math"/>
+                                </a:rPr>
+                                <m:t>3/2</m:t>
+                              </m:r>
+                            </m:sup>
+                          </m:sSup>
+                        </m:num>
+                        <m:den>
+                          <m:r>
+                            <m:rPr>
+                              <m:sty m:val="p"/>
+                            </m:rPr>
+                            <a:rPr lang="el-GR" b="0" i="1" smtClean="0">
+                              <a:latin typeface="Cambria Math"/>
+                            </a:rPr>
+                            <m:t>η</m:t>
+                          </m:r>
+                          <m:r>
+                            <a:rPr lang="en-US" b="0" i="1" smtClean="0">
+                              <a:latin typeface="Cambria Math"/>
+                            </a:rPr>
+                            <m:t>4</m:t>
+                          </m:r>
+                          <m:r>
+                            <a:rPr lang="en-US" b="0" i="1" smtClean="0">
+                              <a:latin typeface="Cambria Math"/>
+                            </a:rPr>
+                            <m:t>𝑟</m:t>
+                          </m:r>
+                          <m:r>
+                            <m:rPr>
+                              <m:sty m:val="p"/>
+                            </m:rPr>
+                            <a:rPr lang="en-US" b="0" i="0" smtClean="0">
+                              <a:latin typeface="Cambria Math"/>
+                            </a:rPr>
+                            <m:t>V</m:t>
+                          </m:r>
+                          <m:rad>
+                            <m:radPr>
+                              <m:degHide m:val="on"/>
+                              <m:ctrlPr>
+                                <a:rPr lang="en-US" b="0" i="1" smtClean="0">
+                                  <a:latin typeface="Cambria Math"/>
+                                </a:rPr>
+                              </m:ctrlPr>
+                            </m:radPr>
+                            <m:deg/>
+                            <m:e>
+                              <m:r>
+                                <a:rPr lang="en-US" b="0" i="1" smtClean="0">
+                                  <a:latin typeface="Cambria Math"/>
+                                </a:rPr>
+                                <m:t>2</m:t>
+                              </m:r>
+                              <m:r>
+                                <a:rPr lang="en-US" b="0" i="1" smtClean="0">
+                                  <a:latin typeface="Cambria Math"/>
+                                  <a:ea typeface="Cambria Math"/>
+                                </a:rPr>
+                                <m:t>𝜋𝜌</m:t>
+                              </m:r>
+                            </m:e>
+                          </m:rad>
+                        </m:den>
+                      </m:f>
+                    </m:oMath>
+                  </m:oMathPara>
+                </a14:m>
+                <a:endParaRPr lang="en-US" dirty="0"/>
+              </a:p>
+            </p:txBody>
+          </p:sp>
+        </mc:Choice>
+        <mc:Fallback>
+          <p:sp>
+            <p:nvSpPr>
+              <p:cNvPr id="3" name="TextBox 2"/>
+              <p:cNvSpPr txBox="1">
+                <a:spLocks noRot="1" noChangeAspect="1" noMove="1" noResize="1" noEditPoints="1" noAdjustHandles="1" noChangeArrowheads="1" noChangeShapeType="1" noTextEdit="1"/>
+              </p:cNvSpPr>
+              <p:nvPr/>
+            </p:nvSpPr>
+            <p:spPr>
+              <a:xfrm>
+                <a:off x="669851" y="1483955"/>
+                <a:ext cx="2902689" cy="4363952"/>
+              </a:xfrm>
+              <a:prstGeom prst="rect">
+                <a:avLst/>
+              </a:prstGeom>
+              <a:blipFill rotWithShape="1">
+                <a:blip r:embed="rId4"/>
+                <a:stretch>
+                  <a:fillRect t="-698"/>
+                </a:stretch>
+              </a:blipFill>
+            </p:spPr>
+            <p:txBody>
+              <a:bodyPr/>
+              <a:lstStyle/>
+              <a:p>
+                <a:r>
+                  <a:rPr lang="en-US">
+                    <a:noFill/>
+                  </a:rPr>
+                  <a:t> </a:t>
+                </a:r>
+              </a:p>
+            </p:txBody>
+          </p:sp>
+        </mc:Fallback>
+      </mc:AlternateContent>
+      <p:sp>
+        <p:nvSpPr>
+          <p:cNvPr id="10" name="Rectangle 9"/>
+          <p:cNvSpPr/>
+          <p:nvPr/>
+        </p:nvSpPr>
+        <p:spPr>
+          <a:xfrm>
+            <a:off x="1000078" y="5003332"/>
+            <a:ext cx="2232837" cy="935665"/>
+          </a:xfrm>
+          <a:prstGeom prst="rect">
+            <a:avLst/>
+          </a:prstGeom>
+          <a:noFill/>
+          <a:ln w="28575">
+            <a:solidFill>
+              <a:srgbClr val="FF0000"/>
+            </a:solidFill>
+          </a:ln>
+        </p:spPr>
+        <p:style>
+          <a:lnRef idx="1">
+            <a:schemeClr val="accent1"/>
+          </a:lnRef>
+          <a:fillRef idx="3">
+            <a:schemeClr val="accent1"/>
+          </a:fillRef>
+          <a:effectRef idx="2">
+            <a:schemeClr val="accent1"/>
+          </a:effectRef>
+          <a:fontRef idx="minor">
+            <a:schemeClr val="lt1"/>
+          </a:fontRef>
+        </p:style>
+        <p:txBody>
+          <a:bodyPr rtlCol="0" anchor="ctr"/>
+          <a:lstStyle/>
+          <a:p>
+            <a:pPr algn="ctr"/>
+            <a:endParaRPr lang="en-US"/>
+          </a:p>
+        </p:txBody>
+      </p:sp>
+      <p:sp>
+        <p:nvSpPr>
+          <p:cNvPr id="12" name="Isosceles Triangle 11"/>
+          <p:cNvSpPr/>
+          <p:nvPr/>
+        </p:nvSpPr>
+        <p:spPr>
+          <a:xfrm>
+            <a:off x="6701170" y="1722474"/>
+            <a:ext cx="271129" cy="372140"/>
+          </a:xfrm>
+          <a:prstGeom prst="triangle">
+            <a:avLst/>
+          </a:prstGeom>
+          <a:solidFill>
+            <a:schemeClr val="bg1">
+              <a:lumMod val="75000"/>
+            </a:schemeClr>
+          </a:solidFill>
+          <a:ln>
+            <a:solidFill>
+              <a:schemeClr val="bg1">
+                <a:lumMod val="75000"/>
+              </a:schemeClr>
+            </a:solidFill>
+          </a:ln>
+        </p:spPr>
+        <p:style>
+          <a:lnRef idx="1">
+            <a:schemeClr val="accent1"/>
+          </a:lnRef>
+          <a:fillRef idx="3">
+            <a:schemeClr val="accent1"/>
+          </a:fillRef>
+          <a:effectRef idx="2">
+            <a:schemeClr val="accent1"/>
+          </a:effectRef>
+          <a:fontRef idx="minor">
+            <a:schemeClr val="lt1"/>
+          </a:fontRef>
+        </p:style>
+        <p:txBody>
+          <a:bodyPr rtlCol="0" anchor="ctr"/>
+          <a:lstStyle/>
+          <a:p>
+            <a:pPr algn="ctr"/>
+            <a:endParaRPr lang="en-US"/>
+          </a:p>
+        </p:txBody>
+      </p:sp>
+      <p:sp>
+        <p:nvSpPr>
+          <p:cNvPr id="13" name="Rectangle 12"/>
+          <p:cNvSpPr/>
+          <p:nvPr/>
+        </p:nvSpPr>
+        <p:spPr>
+          <a:xfrm>
+            <a:off x="6767623" y="2094614"/>
+            <a:ext cx="138223" cy="212651"/>
+          </a:xfrm>
+          <a:prstGeom prst="rect">
+            <a:avLst/>
+          </a:prstGeom>
+          <a:solidFill>
+            <a:schemeClr val="bg1">
+              <a:lumMod val="75000"/>
+            </a:schemeClr>
+          </a:solidFill>
+          <a:ln>
+            <a:solidFill>
+              <a:schemeClr val="bg1">
+                <a:lumMod val="75000"/>
+              </a:schemeClr>
+            </a:solidFill>
+          </a:ln>
+        </p:spPr>
+        <p:style>
+          <a:lnRef idx="1">
+            <a:schemeClr val="accent1"/>
+          </a:lnRef>
+          <a:fillRef idx="3">
+            <a:schemeClr val="accent1"/>
+          </a:fillRef>
+          <a:effectRef idx="2">
+            <a:schemeClr val="accent1"/>
+          </a:effectRef>
+          <a:fontRef idx="minor">
+            <a:schemeClr val="lt1"/>
+          </a:fontRef>
+        </p:style>
+        <p:txBody>
+          <a:bodyPr rtlCol="0" anchor="ctr"/>
+          <a:lstStyle/>
+          <a:p>
+            <a:pPr algn="ctr"/>
+            <a:endParaRPr lang="en-US"/>
+          </a:p>
+        </p:txBody>
+      </p:sp>
+      <p:sp>
+        <p:nvSpPr>
+          <p:cNvPr id="14" name="Oval 13"/>
+          <p:cNvSpPr/>
+          <p:nvPr/>
+        </p:nvSpPr>
+        <p:spPr>
+          <a:xfrm>
+            <a:off x="4944997" y="2094614"/>
+            <a:ext cx="3783475" cy="122987"/>
+          </a:xfrm>
+          <a:prstGeom prst="ellipse">
+            <a:avLst/>
+          </a:prstGeom>
+        </p:spPr>
+        <p:style>
+          <a:lnRef idx="1">
+            <a:schemeClr val="accent1"/>
+          </a:lnRef>
+          <a:fillRef idx="3">
+            <a:schemeClr val="accent1"/>
+          </a:fillRef>
+          <a:effectRef idx="2">
+            <a:schemeClr val="accent1"/>
+          </a:effectRef>
+          <a:fontRef idx="minor">
+            <a:schemeClr val="lt1"/>
+          </a:fontRef>
+        </p:style>
+        <p:txBody>
+          <a:bodyPr rtlCol="0" anchor="ctr"/>
+          <a:lstStyle/>
+          <a:p>
+            <a:pPr algn="ctr"/>
+            <a:endParaRPr lang="en-US"/>
+          </a:p>
+        </p:txBody>
+      </p:sp>
+      <p:sp>
+        <p:nvSpPr>
+          <p:cNvPr id="11" name="Rounded Rectangle 10"/>
+          <p:cNvSpPr/>
+          <p:nvPr/>
+        </p:nvSpPr>
+        <p:spPr>
+          <a:xfrm>
+            <a:off x="6406115" y="2307265"/>
+            <a:ext cx="861237" cy="914400"/>
+          </a:xfrm>
+          <a:prstGeom prst="roundRect">
+            <a:avLst/>
+          </a:prstGeom>
+          <a:solidFill>
+            <a:schemeClr val="bg1">
+              <a:lumMod val="75000"/>
+            </a:schemeClr>
+          </a:solidFill>
+          <a:ln>
+            <a:solidFill>
+              <a:schemeClr val="bg1">
+                <a:lumMod val="75000"/>
+              </a:schemeClr>
+            </a:solidFill>
+          </a:ln>
+        </p:spPr>
+        <p:style>
+          <a:lnRef idx="1">
+            <a:schemeClr val="accent1"/>
+          </a:lnRef>
+          <a:fillRef idx="3">
+            <a:schemeClr val="accent1"/>
+          </a:fillRef>
+          <a:effectRef idx="2">
+            <a:schemeClr val="accent1"/>
+          </a:effectRef>
+          <a:fontRef idx="minor">
+            <a:schemeClr val="lt1"/>
+          </a:fontRef>
+        </p:style>
+        <p:txBody>
+          <a:bodyPr rtlCol="0" anchor="ctr"/>
+          <a:lstStyle/>
+          <a:p>
+            <a:pPr algn="ctr"/>
+            <a:endParaRPr lang="en-US"/>
+          </a:p>
+        </p:txBody>
+      </p:sp>
+      <p:cxnSp>
+        <p:nvCxnSpPr>
+          <p:cNvPr id="16" name="Straight Connector 15"/>
+          <p:cNvCxnSpPr/>
+          <p:nvPr/>
+        </p:nvCxnSpPr>
+        <p:spPr>
+          <a:xfrm>
+            <a:off x="6677249" y="3224681"/>
+            <a:ext cx="10633" cy="967563"/>
+          </a:xfrm>
+          <a:prstGeom prst="line">
+            <a:avLst/>
+          </a:prstGeom>
+          <a:ln w="38100">
+            <a:solidFill>
+              <a:srgbClr val="FF0000"/>
+            </a:solidFill>
+          </a:ln>
+        </p:spPr>
+        <p:style>
+          <a:lnRef idx="2">
+            <a:schemeClr val="accent1"/>
+          </a:lnRef>
+          <a:fillRef idx="0">
+            <a:schemeClr val="accent1"/>
+          </a:fillRef>
+          <a:effectRef idx="1">
+            <a:schemeClr val="accent1"/>
+          </a:effectRef>
+          <a:fontRef idx="minor">
+            <a:schemeClr val="tx1"/>
+          </a:fontRef>
+        </p:style>
+      </p:cxnSp>
+      <p:cxnSp>
+        <p:nvCxnSpPr>
+          <p:cNvPr id="17" name="Straight Connector 16"/>
+          <p:cNvCxnSpPr/>
+          <p:nvPr/>
+        </p:nvCxnSpPr>
+        <p:spPr>
+          <a:xfrm>
+            <a:off x="6975409" y="3217064"/>
+            <a:ext cx="11067" cy="1007079"/>
+          </a:xfrm>
+          <a:prstGeom prst="line">
+            <a:avLst/>
+          </a:prstGeom>
+          <a:ln w="38100">
+            <a:solidFill>
+              <a:schemeClr val="tx1"/>
+            </a:solidFill>
+          </a:ln>
+        </p:spPr>
+        <p:style>
+          <a:lnRef idx="2">
+            <a:schemeClr val="accent1"/>
+          </a:lnRef>
+          <a:fillRef idx="0">
+            <a:schemeClr val="accent1"/>
+          </a:fillRef>
+          <a:effectRef idx="1">
+            <a:schemeClr val="accent1"/>
+          </a:effectRef>
+          <a:fontRef idx="minor">
+            <a:schemeClr val="tx1"/>
+          </a:fontRef>
+        </p:style>
+      </p:cxnSp>
+      <p:sp>
+        <p:nvSpPr>
+          <p:cNvPr id="19" name="TextBox 18"/>
+          <p:cNvSpPr txBox="1"/>
+          <p:nvPr/>
+        </p:nvSpPr>
+        <p:spPr>
+          <a:xfrm>
+            <a:off x="5765194" y="1386552"/>
+            <a:ext cx="251339" cy="369332"/>
+          </a:xfrm>
+          <a:prstGeom prst="rect">
+            <a:avLst/>
+          </a:prstGeom>
+          <a:noFill/>
+        </p:spPr>
+        <p:txBody>
+          <a:bodyPr wrap="square" rtlCol="0">
+            <a:spAutoFit/>
+          </a:bodyPr>
+          <a:lstStyle/>
+          <a:p>
+            <a:r>
+              <a:rPr lang="en-US" dirty="0"/>
+              <a:t>r</a:t>
+            </a:r>
+          </a:p>
+        </p:txBody>
+      </p:sp>
+      <p:sp>
+        <p:nvSpPr>
+          <p:cNvPr id="20" name="TextBox 19"/>
+          <p:cNvSpPr txBox="1"/>
+          <p:nvPr/>
+        </p:nvSpPr>
+        <p:spPr>
+          <a:xfrm>
+            <a:off x="6586412" y="4220277"/>
+            <a:ext cx="480854" cy="369332"/>
+          </a:xfrm>
+          <a:prstGeom prst="rect">
+            <a:avLst/>
+          </a:prstGeom>
+          <a:noFill/>
+        </p:spPr>
+        <p:txBody>
+          <a:bodyPr wrap="square" rtlCol="0">
+            <a:spAutoFit/>
+          </a:bodyPr>
+          <a:lstStyle/>
+          <a:p>
+            <a:r>
+              <a:rPr lang="en-US" dirty="0" smtClean="0"/>
+              <a:t>I,V</a:t>
+            </a:r>
+            <a:endParaRPr lang="en-US" dirty="0"/>
+          </a:p>
+        </p:txBody>
+      </p:sp>
+      <p:sp>
+        <p:nvSpPr>
+          <p:cNvPr id="21" name="TextBox 20"/>
+          <p:cNvSpPr txBox="1"/>
+          <p:nvPr/>
+        </p:nvSpPr>
+        <p:spPr>
+          <a:xfrm>
+            <a:off x="6701170" y="2579799"/>
+            <a:ext cx="251339" cy="369332"/>
+          </a:xfrm>
+          <a:prstGeom prst="rect">
+            <a:avLst/>
+          </a:prstGeom>
+          <a:noFill/>
+        </p:spPr>
+        <p:txBody>
+          <a:bodyPr wrap="square" rtlCol="0">
+            <a:spAutoFit/>
+          </a:bodyPr>
+          <a:lstStyle/>
+          <a:p>
+            <a:r>
+              <a:rPr lang="el-GR" dirty="0" smtClean="0"/>
+              <a:t>η</a:t>
+            </a:r>
+            <a:endParaRPr lang="en-US" dirty="0"/>
+          </a:p>
+        </p:txBody>
+      </p:sp>
+      <p:sp>
+        <p:nvSpPr>
+          <p:cNvPr id="22" name="Left Brace 21"/>
+          <p:cNvSpPr/>
+          <p:nvPr/>
+        </p:nvSpPr>
+        <p:spPr>
+          <a:xfrm rot="5400000">
+            <a:off x="5673044" y="992418"/>
+            <a:ext cx="435641" cy="1891737"/>
+          </a:xfrm>
+          <a:prstGeom prst="leftBrace">
+            <a:avLst/>
+          </a:prstGeom>
+        </p:spPr>
+        <p:style>
+          <a:lnRef idx="2">
+            <a:schemeClr val="accent1"/>
+          </a:lnRef>
+          <a:fillRef idx="0">
+            <a:schemeClr val="accent1"/>
+          </a:fillRef>
+          <a:effectRef idx="1">
+            <a:schemeClr val="accent1"/>
+          </a:effectRef>
+          <a:fontRef idx="minor">
+            <a:schemeClr val="tx1"/>
+          </a:fontRef>
+        </p:style>
+        <p:txBody>
+          <a:bodyPr rtlCol="0" anchor="ctr"/>
+          <a:lstStyle/>
+          <a:p>
+            <a:pPr algn="ctr"/>
+            <a:endParaRPr lang="en-US"/>
+          </a:p>
+        </p:txBody>
+      </p:sp>
+      <p:cxnSp>
+        <p:nvCxnSpPr>
+          <p:cNvPr id="24" name="Straight Arrow Connector 23"/>
+          <p:cNvCxnSpPr/>
+          <p:nvPr/>
+        </p:nvCxnSpPr>
+        <p:spPr>
+          <a:xfrm>
+            <a:off x="5241851" y="2307264"/>
+            <a:ext cx="0" cy="909799"/>
+          </a:xfrm>
+          <a:prstGeom prst="straightConnector1">
+            <a:avLst/>
+          </a:prstGeom>
+          <a:ln>
+            <a:tailEnd type="arrow"/>
+          </a:ln>
+        </p:spPr>
+        <p:style>
+          <a:lnRef idx="2">
+            <a:schemeClr val="accent1"/>
+          </a:lnRef>
+          <a:fillRef idx="0">
+            <a:schemeClr val="accent1"/>
+          </a:fillRef>
+          <a:effectRef idx="1">
+            <a:schemeClr val="accent1"/>
+          </a:effectRef>
+          <a:fontRef idx="minor">
+            <a:schemeClr val="tx1"/>
+          </a:fontRef>
+        </p:style>
+      </p:cxnSp>
+      <p:cxnSp>
+        <p:nvCxnSpPr>
+          <p:cNvPr id="25" name="Straight Arrow Connector 24"/>
+          <p:cNvCxnSpPr/>
+          <p:nvPr/>
+        </p:nvCxnSpPr>
+        <p:spPr>
+          <a:xfrm>
+            <a:off x="5890863" y="2314882"/>
+            <a:ext cx="0" cy="909799"/>
+          </a:xfrm>
+          <a:prstGeom prst="straightConnector1">
+            <a:avLst/>
+          </a:prstGeom>
+          <a:ln>
+            <a:tailEnd type="arrow"/>
+          </a:ln>
+        </p:spPr>
+        <p:style>
+          <a:lnRef idx="2">
+            <a:schemeClr val="accent1"/>
+          </a:lnRef>
+          <a:fillRef idx="0">
+            <a:schemeClr val="accent1"/>
+          </a:fillRef>
+          <a:effectRef idx="1">
+            <a:schemeClr val="accent1"/>
+          </a:effectRef>
+          <a:fontRef idx="minor">
+            <a:schemeClr val="tx1"/>
+          </a:fontRef>
+        </p:style>
+      </p:cxnSp>
+      <p:cxnSp>
+        <p:nvCxnSpPr>
+          <p:cNvPr id="26" name="Straight Arrow Connector 25"/>
+          <p:cNvCxnSpPr/>
+          <p:nvPr/>
+        </p:nvCxnSpPr>
+        <p:spPr>
+          <a:xfrm>
+            <a:off x="7630632" y="2314882"/>
+            <a:ext cx="0" cy="909799"/>
+          </a:xfrm>
+          <a:prstGeom prst="straightConnector1">
+            <a:avLst/>
+          </a:prstGeom>
+          <a:ln>
+            <a:tailEnd type="arrow"/>
+          </a:ln>
+        </p:spPr>
+        <p:style>
+          <a:lnRef idx="2">
+            <a:schemeClr val="accent1"/>
+          </a:lnRef>
+          <a:fillRef idx="0">
+            <a:schemeClr val="accent1"/>
+          </a:fillRef>
+          <a:effectRef idx="1">
+            <a:schemeClr val="accent1"/>
+          </a:effectRef>
+          <a:fontRef idx="minor">
+            <a:schemeClr val="tx1"/>
+          </a:fontRef>
+        </p:style>
+      </p:cxnSp>
+      <p:cxnSp>
+        <p:nvCxnSpPr>
+          <p:cNvPr id="27" name="Straight Arrow Connector 26"/>
+          <p:cNvCxnSpPr/>
+          <p:nvPr/>
+        </p:nvCxnSpPr>
+        <p:spPr>
+          <a:xfrm>
+            <a:off x="8185277" y="2314882"/>
+            <a:ext cx="0" cy="909799"/>
+          </a:xfrm>
+          <a:prstGeom prst="straightConnector1">
+            <a:avLst/>
+          </a:prstGeom>
+          <a:ln>
+            <a:tailEnd type="arrow"/>
+          </a:ln>
+        </p:spPr>
+        <p:style>
+          <a:lnRef idx="2">
+            <a:schemeClr val="accent1"/>
+          </a:lnRef>
+          <a:fillRef idx="0">
+            <a:schemeClr val="accent1"/>
+          </a:fillRef>
+          <a:effectRef idx="1">
+            <a:schemeClr val="accent1"/>
+          </a:effectRef>
+          <a:fontRef idx="minor">
+            <a:schemeClr val="tx1"/>
+          </a:fontRef>
+        </p:style>
+      </p:cxnSp>
+      <mc:AlternateContent xmlns:mc="http://schemas.openxmlformats.org/markup-compatibility/2006">
+        <mc:Choice xmlns:a14="http://schemas.microsoft.com/office/drawing/2010/main" Requires="a14">
+          <p:sp>
+            <p:nvSpPr>
+              <p:cNvPr id="28" name="TextBox 27"/>
+              <p:cNvSpPr txBox="1"/>
+              <p:nvPr/>
+            </p:nvSpPr>
+            <p:spPr>
+              <a:xfrm>
+                <a:off x="7767659" y="2577497"/>
+                <a:ext cx="251339" cy="369332"/>
+              </a:xfrm>
+              <a:prstGeom prst="rect">
+                <a:avLst/>
+              </a:prstGeom>
+              <a:noFill/>
+            </p:spPr>
+            <p:txBody>
+              <a:bodyPr wrap="square" rtlCol="0">
+                <a:spAutoFit/>
+              </a:bodyPr>
+              <a:lstStyle/>
+              <a:p>
+                <a14:m>
+                  <m:oMathPara xmlns:m="http://schemas.openxmlformats.org/officeDocument/2006/math">
+                    <m:oMathParaPr>
+                      <m:jc m:val="centerGroup"/>
+                    </m:oMathParaPr>
+                    <m:oMath xmlns:m="http://schemas.openxmlformats.org/officeDocument/2006/math">
+                      <m:r>
+                        <a:rPr lang="en-US" b="0" i="1" smtClean="0">
+                          <a:latin typeface="Cambria Math"/>
+                        </a:rPr>
+                        <m:t>𝑣</m:t>
+                      </m:r>
+                    </m:oMath>
+                  </m:oMathPara>
+                </a14:m>
+                <a:endParaRPr lang="en-US" i="1" dirty="0"/>
+              </a:p>
+            </p:txBody>
+          </p:sp>
+        </mc:Choice>
+        <mc:Fallback>
+          <p:sp>
+            <p:nvSpPr>
+              <p:cNvPr id="28" name="TextBox 27"/>
+              <p:cNvSpPr txBox="1">
+                <a:spLocks noRot="1" noChangeAspect="1" noMove="1" noResize="1" noEditPoints="1" noAdjustHandles="1" noChangeArrowheads="1" noChangeShapeType="1" noTextEdit="1"/>
+              </p:cNvSpPr>
+              <p:nvPr/>
+            </p:nvSpPr>
+            <p:spPr>
+              <a:xfrm>
+                <a:off x="7767659" y="2577497"/>
+                <a:ext cx="251339" cy="369332"/>
+              </a:xfrm>
+              <a:prstGeom prst="rect">
+                <a:avLst/>
+              </a:prstGeom>
+              <a:blipFill rotWithShape="1">
+                <a:blip r:embed="rId5"/>
+                <a:stretch>
+                  <a:fillRect r="-14634"/>
+                </a:stretch>
+              </a:blipFill>
+            </p:spPr>
+            <p:txBody>
+              <a:bodyPr/>
+              <a:lstStyle/>
+              <a:p>
+                <a:r>
+                  <a:rPr lang="en-US">
+                    <a:noFill/>
+                  </a:rPr>
+                  <a:t> </a:t>
+                </a:r>
+              </a:p>
+            </p:txBody>
+          </p:sp>
+        </mc:Fallback>
+      </mc:AlternateContent>
+    </p:spTree>
+    <p:extLst>
+      <p:ext uri="{BB962C8B-B14F-4D97-AF65-F5344CB8AC3E}">
+        <p14:creationId xmlns:p14="http://schemas.microsoft.com/office/powerpoint/2010/main" val="1583129321"/>
+      </p:ext>
+    </p:extLst>
+  </p:cSld>
+  <p:clrMapOvr>
+    <a:masterClrMapping/>
+  </p:clrMapOvr>
+  <p:timing>
+    <p:tnLst>
+      <p:par>
+        <p:cTn id="1" dur="indefinite" restart="never" nodeType="tmRoot">
+          <p:childTnLst>
+            <p:seq concurrent="1" nextAc="seek">
+              <p:cTn id="2" dur="indefinite" nodeType="mainSeq">
+                <p:childTnLst>
+                  <p:par>
+                    <p:cTn id="3" fill="hold">
+                      <p:stCondLst>
+                        <p:cond delay="indefinite"/>
+                      </p:stCondLst>
+                      <p:childTnLst>
+                        <p:par>
+                          <p:cTn id="4" fill="hold">
+                            <p:stCondLst>
+                              <p:cond delay="0"/>
+                            </p:stCondLst>
+                            <p:childTnLst>
+                              <p:par>
+                                <p:cTn id="5" presetID="1" presetClass="entr" presetSubtype="0" fill="hold" grpId="0" nodeType="clickEffect">
+                                  <p:stCondLst>
+                                    <p:cond delay="0"/>
+                                  </p:stCondLst>
+                                  <p:childTnLst>
+                                    <p:set>
+                                      <p:cBhvr>
+                                        <p:cTn id="6" dur="1" fill="hold">
+                                          <p:stCondLst>
+                                            <p:cond delay="0"/>
+                                          </p:stCondLst>
+                                        </p:cTn>
+                                        <p:tgtEl>
+                                          <p:spTgt spid="10"/>
+                                        </p:tgtEl>
+                                        <p:attrNameLst>
+                                          <p:attrName>style.visibility</p:attrName>
+                                        </p:attrNameLst>
+                                      </p:cBhvr>
+                                      <p:to>
+                                        <p:strVal val="visible"/>
+                                      </p:to>
+                                    </p:set>
+                                  </p:childTnLst>
+                                </p:cTn>
+                              </p:par>
+                            </p:childTnLst>
+                          </p:cTn>
+                        </p:par>
+                      </p:childTnLst>
+                    </p:cTn>
+                  </p:par>
+                </p:childTnLst>
+              </p:cTn>
+              <p:prevCondLst>
+                <p:cond evt="onPrev" delay="0">
+                  <p:tgtEl>
+                    <p:sldTgt/>
+                  </p:tgtEl>
+                </p:cond>
+              </p:prevCondLst>
+              <p:nextCondLst>
+                <p:cond evt="onNext" delay="0">
+                  <p:tgtEl>
+                    <p:sldTgt/>
+                  </p:tgtEl>
+                </p:cond>
+              </p:nextCondLst>
+            </p:seq>
+          </p:childTnLst>
+        </p:cTn>
+      </p:par>
+    </p:tnLst>
+    <p:bldLst>
+      <p:bldP spid="10" grpId="0" animBg="1"/>
+    </p:bldLst>
   </p:timing>
 </p:sld>
 </file>

</xml_diff>

<commit_message>
updates to slides and such
</commit_message>
<xml_diff>
--- a/Presentations/Mid Semester Review/Individual_Slides/Tyler/Slide template.pptx
+++ b/Presentations/Mid Semester Review/Individual_Slides/Tyler/Slide template.pptx
@@ -5,15 +5,16 @@
     <p:sldMasterId id="2147483648" r:id="rId1"/>
   </p:sldMasterIdLst>
   <p:notesMasterIdLst>
-    <p:notesMasterId r:id="rId8"/>
+    <p:notesMasterId r:id="rId9"/>
   </p:notesMasterIdLst>
   <p:sldIdLst>
     <p:sldId id="260" r:id="rId2"/>
     <p:sldId id="257" r:id="rId3"/>
     <p:sldId id="258" r:id="rId4"/>
-    <p:sldId id="256" r:id="rId5"/>
-    <p:sldId id="259" r:id="rId6"/>
-    <p:sldId id="261" r:id="rId7"/>
+    <p:sldId id="262" r:id="rId5"/>
+    <p:sldId id="256" r:id="rId6"/>
+    <p:sldId id="259" r:id="rId7"/>
+    <p:sldId id="261" r:id="rId8"/>
   </p:sldIdLst>
   <p:sldSz cx="9144000" cy="6858000" type="screen4x3"/>
   <p:notesSz cx="6858000" cy="9144000"/>
@@ -197,7 +198,7 @@
           <a:p>
             <a:fld id="{51E4185F-0EA7-4BA8-A08E-5754056CFC72}" type="datetimeFigureOut">
               <a:rPr lang="en-US" smtClean="0"/>
-              <a:t>10/19/2015</a:t>
+              <a:t>10/20/2015</a:t>
             </a:fld>
             <a:endParaRPr lang="en-US"/>
           </a:p>
@@ -530,7 +531,7 @@
           <a:p>
             <a:fld id="{CC3B56EF-EB95-49F2-A5A6-537DEE8FE14C}" type="slidenum">
               <a:rPr lang="en-US" smtClean="0"/>
-              <a:t>4</a:t>
+              <a:t>5</a:t>
             </a:fld>
             <a:endParaRPr lang="en-US"/>
           </a:p>
@@ -730,7 +731,7 @@
           <a:p>
             <a:fld id="{A8193F1D-56DB-E44D-9849-55B52730CCEA}" type="datetimeFigureOut">
               <a:rPr lang="en-US" smtClean="0"/>
-              <a:t>10/19/2015</a:t>
+              <a:t>10/20/2015</a:t>
             </a:fld>
             <a:endParaRPr lang="en-US"/>
           </a:p>
@@ -900,7 +901,7 @@
           <a:p>
             <a:fld id="{A8193F1D-56DB-E44D-9849-55B52730CCEA}" type="datetimeFigureOut">
               <a:rPr lang="en-US" smtClean="0"/>
-              <a:t>10/19/2015</a:t>
+              <a:t>10/20/2015</a:t>
             </a:fld>
             <a:endParaRPr lang="en-US"/>
           </a:p>
@@ -1080,7 +1081,7 @@
           <a:p>
             <a:fld id="{A8193F1D-56DB-E44D-9849-55B52730CCEA}" type="datetimeFigureOut">
               <a:rPr lang="en-US" smtClean="0"/>
-              <a:t>10/19/2015</a:t>
+              <a:t>10/20/2015</a:t>
             </a:fld>
             <a:endParaRPr lang="en-US"/>
           </a:p>
@@ -1250,7 +1251,7 @@
           <a:p>
             <a:fld id="{A8193F1D-56DB-E44D-9849-55B52730CCEA}" type="datetimeFigureOut">
               <a:rPr lang="en-US" smtClean="0"/>
-              <a:t>10/19/2015</a:t>
+              <a:t>10/20/2015</a:t>
             </a:fld>
             <a:endParaRPr lang="en-US"/>
           </a:p>
@@ -1496,7 +1497,7 @@
           <a:p>
             <a:fld id="{A8193F1D-56DB-E44D-9849-55B52730CCEA}" type="datetimeFigureOut">
               <a:rPr lang="en-US" smtClean="0"/>
-              <a:t>10/19/2015</a:t>
+              <a:t>10/20/2015</a:t>
             </a:fld>
             <a:endParaRPr lang="en-US"/>
           </a:p>
@@ -1784,7 +1785,7 @@
           <a:p>
             <a:fld id="{A8193F1D-56DB-E44D-9849-55B52730CCEA}" type="datetimeFigureOut">
               <a:rPr lang="en-US" smtClean="0"/>
-              <a:t>10/19/2015</a:t>
+              <a:t>10/20/2015</a:t>
             </a:fld>
             <a:endParaRPr lang="en-US"/>
           </a:p>
@@ -2206,7 +2207,7 @@
           <a:p>
             <a:fld id="{A8193F1D-56DB-E44D-9849-55B52730CCEA}" type="datetimeFigureOut">
               <a:rPr lang="en-US" smtClean="0"/>
-              <a:t>10/19/2015</a:t>
+              <a:t>10/20/2015</a:t>
             </a:fld>
             <a:endParaRPr lang="en-US"/>
           </a:p>
@@ -2324,7 +2325,7 @@
           <a:p>
             <a:fld id="{A8193F1D-56DB-E44D-9849-55B52730CCEA}" type="datetimeFigureOut">
               <a:rPr lang="en-US" smtClean="0"/>
-              <a:t>10/19/2015</a:t>
+              <a:t>10/20/2015</a:t>
             </a:fld>
             <a:endParaRPr lang="en-US"/>
           </a:p>
@@ -2419,7 +2420,7 @@
           <a:p>
             <a:fld id="{A8193F1D-56DB-E44D-9849-55B52730CCEA}" type="datetimeFigureOut">
               <a:rPr lang="en-US" smtClean="0"/>
-              <a:t>10/19/2015</a:t>
+              <a:t>10/20/2015</a:t>
             </a:fld>
             <a:endParaRPr lang="en-US"/>
           </a:p>
@@ -2696,7 +2697,7 @@
           <a:p>
             <a:fld id="{A8193F1D-56DB-E44D-9849-55B52730CCEA}" type="datetimeFigureOut">
               <a:rPr lang="en-US" smtClean="0"/>
-              <a:t>10/19/2015</a:t>
+              <a:t>10/20/2015</a:t>
             </a:fld>
             <a:endParaRPr lang="en-US"/>
           </a:p>
@@ -2949,7 +2950,7 @@
           <a:p>
             <a:fld id="{A8193F1D-56DB-E44D-9849-55B52730CCEA}" type="datetimeFigureOut">
               <a:rPr lang="en-US" smtClean="0"/>
-              <a:t>10/19/2015</a:t>
+              <a:t>10/20/2015</a:t>
             </a:fld>
             <a:endParaRPr lang="en-US"/>
           </a:p>
@@ -3162,7 +3163,7 @@
           <a:p>
             <a:fld id="{A8193F1D-56DB-E44D-9849-55B52730CCEA}" type="datetimeFigureOut">
               <a:rPr lang="en-US" smtClean="0"/>
-              <a:t>10/19/2015</a:t>
+              <a:t>10/20/2015</a:t>
             </a:fld>
             <a:endParaRPr lang="en-US"/>
           </a:p>
@@ -6740,6 +6741,526 @@
             <p:nvPr/>
           </p:nvPicPr>
           <p:blipFill>
+            <a:blip r:embed="rId2">
+              <a:extLst>
+                <a:ext uri="{28A0092B-C50C-407E-A947-70E740481C1C}">
+                  <a14:useLocalDpi xmlns:a14="http://schemas.microsoft.com/office/drawing/2010/main" val="0"/>
+                </a:ext>
+              </a:extLst>
+            </a:blip>
+            <a:stretch>
+              <a:fillRect/>
+            </a:stretch>
+          </p:blipFill>
+          <p:spPr>
+            <a:xfrm>
+              <a:off x="0" y="1"/>
+              <a:ext cx="1151748" cy="844012"/>
+            </a:xfrm>
+            <a:prstGeom prst="rect">
+              <a:avLst/>
+            </a:prstGeom>
+          </p:spPr>
+        </p:pic>
+        <p:sp>
+          <p:nvSpPr>
+            <p:cNvPr id="7" name="Rectangle 6"/>
+            <p:cNvSpPr/>
+            <p:nvPr/>
+          </p:nvSpPr>
+          <p:spPr>
+            <a:xfrm>
+              <a:off x="1151748" y="2283"/>
+              <a:ext cx="7992252" cy="832104"/>
+            </a:xfrm>
+            <a:prstGeom prst="rect">
+              <a:avLst/>
+            </a:prstGeom>
+            <a:solidFill>
+              <a:schemeClr val="tx1"/>
+            </a:solidFill>
+            <a:ln>
+              <a:solidFill>
+                <a:schemeClr val="tx1"/>
+              </a:solidFill>
+            </a:ln>
+            <a:effectLst/>
+          </p:spPr>
+          <p:style>
+            <a:lnRef idx="1">
+              <a:schemeClr val="accent1"/>
+            </a:lnRef>
+            <a:fillRef idx="3">
+              <a:schemeClr val="accent1"/>
+            </a:fillRef>
+            <a:effectRef idx="2">
+              <a:schemeClr val="accent1"/>
+            </a:effectRef>
+            <a:fontRef idx="minor">
+              <a:schemeClr val="lt1"/>
+            </a:fontRef>
+          </p:style>
+          <p:txBody>
+            <a:bodyPr rtlCol="0" anchor="ctr"/>
+            <a:lstStyle/>
+            <a:p>
+              <a:pPr algn="ctr"/>
+              <a:endParaRPr lang="en-US"/>
+            </a:p>
+          </p:txBody>
+        </p:sp>
+        <p:pic>
+          <p:nvPicPr>
+            <p:cNvPr id="8" name="Picture 7"/>
+            <p:cNvPicPr>
+              <a:picLocks noChangeAspect="1"/>
+            </p:cNvPicPr>
+            <p:nvPr/>
+          </p:nvPicPr>
+          <p:blipFill>
+            <a:blip r:embed="rId3"/>
+            <a:stretch>
+              <a:fillRect/>
+            </a:stretch>
+          </p:blipFill>
+          <p:spPr>
+            <a:xfrm>
+              <a:off x="8311013" y="2283"/>
+              <a:ext cx="832987" cy="832987"/>
+            </a:xfrm>
+            <a:prstGeom prst="rect">
+              <a:avLst/>
+            </a:prstGeom>
+          </p:spPr>
+        </p:pic>
+        <p:sp>
+          <p:nvSpPr>
+            <p:cNvPr id="9" name="TextBox 8"/>
+            <p:cNvSpPr txBox="1"/>
+            <p:nvPr/>
+          </p:nvSpPr>
+          <p:spPr>
+            <a:xfrm>
+              <a:off x="1202040" y="188621"/>
+              <a:ext cx="6983237" cy="461665"/>
+            </a:xfrm>
+            <a:prstGeom prst="rect">
+              <a:avLst/>
+            </a:prstGeom>
+            <a:noFill/>
+          </p:spPr>
+          <p:txBody>
+            <a:bodyPr wrap="square" rtlCol="0">
+              <a:spAutoFit/>
+            </a:bodyPr>
+            <a:lstStyle/>
+            <a:p>
+              <a:pPr algn="ctr"/>
+              <a:r>
+                <a:rPr lang="en-US" sz="2400" dirty="0" err="1" smtClean="0">
+                  <a:solidFill>
+                    <a:srgbClr val="FFFFFF"/>
+                  </a:solidFill>
+                  <a:latin typeface="Candara"/>
+                  <a:cs typeface="Candara"/>
+                </a:rPr>
+                <a:t>AlienBee</a:t>
+              </a:r>
+              <a:r>
+                <a:rPr lang="en-US" sz="2400" dirty="0" smtClean="0">
+                  <a:solidFill>
+                    <a:srgbClr val="FFFFFF"/>
+                  </a:solidFill>
+                  <a:latin typeface="Candara"/>
+                  <a:cs typeface="Candara"/>
+                </a:rPr>
+                <a:t> Copter with Custom Modifications</a:t>
+              </a:r>
+              <a:endParaRPr lang="en-US" sz="2400" dirty="0">
+                <a:solidFill>
+                  <a:srgbClr val="FFFFFF"/>
+                </a:solidFill>
+                <a:latin typeface="Candara"/>
+                <a:cs typeface="Candara"/>
+              </a:endParaRPr>
+            </a:p>
+          </p:txBody>
+        </p:sp>
+      </p:grpSp>
+      <p:pic>
+        <p:nvPicPr>
+          <p:cNvPr id="2" name="Picture 1"/>
+          <p:cNvPicPr>
+            <a:picLocks noChangeAspect="1"/>
+          </p:cNvPicPr>
+          <p:nvPr/>
+        </p:nvPicPr>
+        <p:blipFill>
+          <a:blip r:embed="rId4">
+            <a:extLst>
+              <a:ext uri="{28A0092B-C50C-407E-A947-70E740481C1C}">
+                <a14:useLocalDpi xmlns:a14="http://schemas.microsoft.com/office/drawing/2010/main" val="0"/>
+              </a:ext>
+            </a:extLst>
+          </a:blip>
+          <a:stretch>
+            <a:fillRect/>
+          </a:stretch>
+        </p:blipFill>
+        <p:spPr>
+          <a:xfrm rot="16200000">
+            <a:off x="4897267" y="2551385"/>
+            <a:ext cx="2979206" cy="5297962"/>
+          </a:xfrm>
+          <a:prstGeom prst="rect">
+            <a:avLst/>
+          </a:prstGeom>
+        </p:spPr>
+      </p:pic>
+      <p:pic>
+        <p:nvPicPr>
+          <p:cNvPr id="10" name="Picture 9"/>
+          <p:cNvPicPr>
+            <a:picLocks noChangeAspect="1"/>
+          </p:cNvPicPr>
+          <p:nvPr/>
+        </p:nvPicPr>
+        <p:blipFill>
+          <a:blip r:embed="rId5">
+            <a:extLst>
+              <a:ext uri="{28A0092B-C50C-407E-A947-70E740481C1C}">
+                <a14:useLocalDpi xmlns:a14="http://schemas.microsoft.com/office/drawing/2010/main" val="0"/>
+              </a:ext>
+            </a:extLst>
+          </a:blip>
+          <a:stretch>
+            <a:fillRect/>
+          </a:stretch>
+        </p:blipFill>
+        <p:spPr>
+          <a:xfrm>
+            <a:off x="61506" y="991010"/>
+            <a:ext cx="4510494" cy="2536389"/>
+          </a:xfrm>
+          <a:prstGeom prst="rect">
+            <a:avLst/>
+          </a:prstGeom>
+        </p:spPr>
+      </p:pic>
+      <p:cxnSp>
+        <p:nvCxnSpPr>
+          <p:cNvPr id="12" name="Straight Arrow Connector 11"/>
+          <p:cNvCxnSpPr/>
+          <p:nvPr/>
+        </p:nvCxnSpPr>
+        <p:spPr>
+          <a:xfrm flipH="1" flipV="1">
+            <a:off x="2137144" y="2679405"/>
+            <a:ext cx="179609" cy="1315056"/>
+          </a:xfrm>
+          <a:prstGeom prst="straightConnector1">
+            <a:avLst/>
+          </a:prstGeom>
+          <a:ln w="28575">
+            <a:solidFill>
+              <a:srgbClr val="FF0000"/>
+            </a:solidFill>
+            <a:tailEnd type="arrow"/>
+          </a:ln>
+        </p:spPr>
+        <p:style>
+          <a:lnRef idx="2">
+            <a:schemeClr val="accent1"/>
+          </a:lnRef>
+          <a:fillRef idx="0">
+            <a:schemeClr val="accent1"/>
+          </a:fillRef>
+          <a:effectRef idx="1">
+            <a:schemeClr val="accent1"/>
+          </a:effectRef>
+          <a:fontRef idx="minor">
+            <a:schemeClr val="tx1"/>
+          </a:fontRef>
+        </p:style>
+      </p:cxnSp>
+      <p:cxnSp>
+        <p:nvCxnSpPr>
+          <p:cNvPr id="13" name="Straight Arrow Connector 12"/>
+          <p:cNvCxnSpPr/>
+          <p:nvPr/>
+        </p:nvCxnSpPr>
+        <p:spPr>
+          <a:xfrm flipV="1">
+            <a:off x="2524717" y="2679405"/>
+            <a:ext cx="167720" cy="1315056"/>
+          </a:xfrm>
+          <a:prstGeom prst="straightConnector1">
+            <a:avLst/>
+          </a:prstGeom>
+          <a:ln w="28575">
+            <a:solidFill>
+              <a:srgbClr val="FF0000"/>
+            </a:solidFill>
+            <a:tailEnd type="arrow"/>
+          </a:ln>
+        </p:spPr>
+        <p:style>
+          <a:lnRef idx="2">
+            <a:schemeClr val="accent1"/>
+          </a:lnRef>
+          <a:fillRef idx="0">
+            <a:schemeClr val="accent1"/>
+          </a:fillRef>
+          <a:effectRef idx="1">
+            <a:schemeClr val="accent1"/>
+          </a:effectRef>
+          <a:fontRef idx="minor">
+            <a:schemeClr val="tx1"/>
+          </a:fontRef>
+        </p:style>
+      </p:cxnSp>
+      <p:sp>
+        <p:nvSpPr>
+          <p:cNvPr id="15" name="TextBox 14"/>
+          <p:cNvSpPr txBox="1"/>
+          <p:nvPr/>
+        </p:nvSpPr>
+        <p:spPr>
+          <a:xfrm>
+            <a:off x="1605529" y="3965939"/>
+            <a:ext cx="1648047" cy="646331"/>
+          </a:xfrm>
+          <a:prstGeom prst="rect">
+            <a:avLst/>
+          </a:prstGeom>
+          <a:noFill/>
+        </p:spPr>
+        <p:txBody>
+          <a:bodyPr wrap="square" rtlCol="0">
+            <a:spAutoFit/>
+          </a:bodyPr>
+          <a:lstStyle/>
+          <a:p>
+            <a:r>
+              <a:rPr lang="en-US" dirty="0" smtClean="0"/>
+              <a:t>Custom Plastic </a:t>
+            </a:r>
+          </a:p>
+          <a:p>
+            <a:r>
+              <a:rPr lang="en-US" dirty="0" smtClean="0"/>
+              <a:t>Landing Gear</a:t>
+            </a:r>
+            <a:endParaRPr lang="en-US" dirty="0"/>
+          </a:p>
+        </p:txBody>
+      </p:sp>
+      <p:cxnSp>
+        <p:nvCxnSpPr>
+          <p:cNvPr id="16" name="Straight Arrow Connector 15"/>
+          <p:cNvCxnSpPr/>
+          <p:nvPr/>
+        </p:nvCxnSpPr>
+        <p:spPr>
+          <a:xfrm flipH="1" flipV="1">
+            <a:off x="4242394" y="2466753"/>
+            <a:ext cx="1677653" cy="449979"/>
+          </a:xfrm>
+          <a:prstGeom prst="straightConnector1">
+            <a:avLst/>
+          </a:prstGeom>
+          <a:ln w="28575">
+            <a:solidFill>
+              <a:srgbClr val="FF0000"/>
+            </a:solidFill>
+            <a:tailEnd type="arrow"/>
+          </a:ln>
+        </p:spPr>
+        <p:style>
+          <a:lnRef idx="2">
+            <a:schemeClr val="accent1"/>
+          </a:lnRef>
+          <a:fillRef idx="0">
+            <a:schemeClr val="accent1"/>
+          </a:fillRef>
+          <a:effectRef idx="1">
+            <a:schemeClr val="accent1"/>
+          </a:effectRef>
+          <a:fontRef idx="minor">
+            <a:schemeClr val="tx1"/>
+          </a:fontRef>
+        </p:style>
+      </p:cxnSp>
+      <p:cxnSp>
+        <p:nvCxnSpPr>
+          <p:cNvPr id="18" name="Straight Arrow Connector 17"/>
+          <p:cNvCxnSpPr/>
+          <p:nvPr/>
+        </p:nvCxnSpPr>
+        <p:spPr>
+          <a:xfrm flipH="1">
+            <a:off x="5528930" y="2916732"/>
+            <a:ext cx="391117" cy="1077729"/>
+          </a:xfrm>
+          <a:prstGeom prst="straightConnector1">
+            <a:avLst/>
+          </a:prstGeom>
+          <a:ln w="28575">
+            <a:solidFill>
+              <a:srgbClr val="FF0000"/>
+            </a:solidFill>
+            <a:tailEnd type="arrow"/>
+          </a:ln>
+        </p:spPr>
+        <p:style>
+          <a:lnRef idx="2">
+            <a:schemeClr val="accent1"/>
+          </a:lnRef>
+          <a:fillRef idx="0">
+            <a:schemeClr val="accent1"/>
+          </a:fillRef>
+          <a:effectRef idx="1">
+            <a:schemeClr val="accent1"/>
+          </a:effectRef>
+          <a:fontRef idx="minor">
+            <a:schemeClr val="tx1"/>
+          </a:fontRef>
+        </p:style>
+      </p:cxnSp>
+      <p:sp>
+        <p:nvSpPr>
+          <p:cNvPr id="21" name="TextBox 20"/>
+          <p:cNvSpPr txBox="1"/>
+          <p:nvPr/>
+        </p:nvSpPr>
+        <p:spPr>
+          <a:xfrm>
+            <a:off x="5898781" y="2593566"/>
+            <a:ext cx="3052455" cy="646331"/>
+          </a:xfrm>
+          <a:prstGeom prst="rect">
+            <a:avLst/>
+          </a:prstGeom>
+          <a:noFill/>
+        </p:spPr>
+        <p:txBody>
+          <a:bodyPr wrap="square" rtlCol="0">
+            <a:spAutoFit/>
+          </a:bodyPr>
+          <a:lstStyle/>
+          <a:p>
+            <a:r>
+              <a:rPr lang="en-US" dirty="0" smtClean="0"/>
+              <a:t>Custom </a:t>
+            </a:r>
+            <a:r>
+              <a:rPr lang="en-US" dirty="0"/>
+              <a:t>b</a:t>
+            </a:r>
+            <a:r>
+              <a:rPr lang="en-US" dirty="0" smtClean="0"/>
+              <a:t>lade guards created from a Hula Hoop</a:t>
+            </a:r>
+            <a:endParaRPr lang="en-US" dirty="0"/>
+          </a:p>
+        </p:txBody>
+      </p:sp>
+    </p:spTree>
+    <p:extLst>
+      <p:ext uri="{BB962C8B-B14F-4D97-AF65-F5344CB8AC3E}">
+        <p14:creationId xmlns:p14="http://schemas.microsoft.com/office/powerpoint/2010/main" val="871465337"/>
+      </p:ext>
+    </p:extLst>
+  </p:cSld>
+  <p:clrMapOvr>
+    <a:masterClrMapping/>
+  </p:clrMapOvr>
+  <p:timing>
+    <p:tnLst>
+      <p:par>
+        <p:cTn id="1" dur="indefinite" restart="never" nodeType="tmRoot"/>
+      </p:par>
+    </p:tnLst>
+  </p:timing>
+</p:sld>
+</file>
+
+<file path=ppt/slides/slide5.xml><?xml version="1.0" encoding="utf-8"?>
+<p:sld xmlns:a="http://schemas.openxmlformats.org/drawingml/2006/main" xmlns:r="http://schemas.openxmlformats.org/officeDocument/2006/relationships" xmlns:p="http://schemas.openxmlformats.org/presentationml/2006/main">
+  <p:cSld>
+    <p:spTree>
+      <p:nvGrpSpPr>
+        <p:cNvPr id="1" name=""/>
+        <p:cNvGrpSpPr/>
+        <p:nvPr/>
+      </p:nvGrpSpPr>
+      <p:grpSpPr>
+        <a:xfrm>
+          <a:off x="0" y="0"/>
+          <a:ext cx="0" cy="0"/>
+          <a:chOff x="0" y="0"/>
+          <a:chExt cx="0" cy="0"/>
+        </a:xfrm>
+      </p:grpSpPr>
+      <p:grpSp>
+        <p:nvGrpSpPr>
+          <p:cNvPr id="4" name="Group 3"/>
+          <p:cNvGrpSpPr/>
+          <p:nvPr/>
+        </p:nvGrpSpPr>
+        <p:grpSpPr>
+          <a:xfrm>
+            <a:off x="0" y="1"/>
+            <a:ext cx="9144000" cy="844012"/>
+            <a:chOff x="0" y="1"/>
+            <a:chExt cx="9144000" cy="844012"/>
+          </a:xfrm>
+        </p:grpSpPr>
+        <p:cxnSp>
+          <p:nvCxnSpPr>
+            <p:cNvPr id="5" name="Straight Connector 4"/>
+            <p:cNvCxnSpPr/>
+            <p:nvPr/>
+          </p:nvCxnSpPr>
+          <p:spPr>
+            <a:xfrm>
+              <a:off x="0" y="844013"/>
+              <a:ext cx="9144000" cy="0"/>
+            </a:xfrm>
+            <a:prstGeom prst="line">
+              <a:avLst/>
+            </a:prstGeom>
+            <a:ln>
+              <a:solidFill>
+                <a:schemeClr val="tx1"/>
+              </a:solidFill>
+            </a:ln>
+            <a:effectLst/>
+          </p:spPr>
+          <p:style>
+            <a:lnRef idx="2">
+              <a:schemeClr val="accent1"/>
+            </a:lnRef>
+            <a:fillRef idx="0">
+              <a:schemeClr val="accent1"/>
+            </a:fillRef>
+            <a:effectRef idx="1">
+              <a:schemeClr val="accent1"/>
+            </a:effectRef>
+            <a:fontRef idx="minor">
+              <a:schemeClr val="tx1"/>
+            </a:fontRef>
+          </p:style>
+        </p:cxnSp>
+        <p:pic>
+          <p:nvPicPr>
+            <p:cNvPr id="6" name="Picture 5" descr="Screen Shot 2015-10-11 at 11.16.20 AM.png"/>
+            <p:cNvPicPr>
+              <a:picLocks noChangeAspect="1"/>
+            </p:cNvPicPr>
+            <p:nvPr/>
+          </p:nvPicPr>
+          <p:blipFill>
             <a:blip r:embed="rId3">
               <a:extLst>
                 <a:ext uri="{28A0092B-C50C-407E-A947-70E740481C1C}">
@@ -6915,14 +7436,14 @@
           <p:nvPr>
             <p:extLst>
               <p:ext uri="{D42A27DB-BD31-4B8C-83A1-F6EECF244321}">
-                <p14:modId xmlns:p14="http://schemas.microsoft.com/office/powerpoint/2010/main" val="3168648641"/>
+                <p14:modId xmlns:p14="http://schemas.microsoft.com/office/powerpoint/2010/main" val="2114426086"/>
               </p:ext>
             </p:extLst>
           </p:nvPr>
         </p:nvGraphicFramePr>
         <p:xfrm>
-          <a:off x="1151748" y="2040882"/>
-          <a:ext cx="7203512" cy="2565400"/>
+          <a:off x="981765" y="1498622"/>
+          <a:ext cx="7203512" cy="2194560"/>
         </p:xfrm>
         <a:graphic>
           <a:graphicData uri="http://schemas.openxmlformats.org/drawingml/2006/table">
@@ -7024,8 +7545,12 @@
                     <a:p>
                       <a:pPr algn="ctr"/>
                       <a:r>
-                        <a:rPr lang="en-US" b="1" dirty="0" smtClean="0"/>
-                        <a:t>M100</a:t>
+                        <a:rPr lang="en-US" b="1" dirty="0" err="1" smtClean="0"/>
+                        <a:t>AlienBee</a:t>
+                      </a:r>
+                      <a:r>
+                        <a:rPr lang="en-US" b="1" baseline="0" dirty="0" smtClean="0"/>
+                        <a:t> w/ RGBD</a:t>
                       </a:r>
                       <a:endParaRPr lang="en-US" b="1" dirty="0"/>
                     </a:p>
@@ -7040,7 +7565,11 @@
                       <a:pPr algn="ctr"/>
                       <a:r>
                         <a:rPr lang="en-US" dirty="0" smtClean="0"/>
-                        <a:t>2.77 (3.22)</a:t>
+                        <a:t>1.91</a:t>
+                      </a:r>
+                      <a:r>
+                        <a:rPr lang="en-US" baseline="0" dirty="0" smtClean="0"/>
+                        <a:t> (2.36)</a:t>
                       </a:r>
                       <a:endParaRPr lang="en-US" dirty="0"/>
                     </a:p>
@@ -7055,7 +7584,7 @@
                       <a:pPr algn="ctr"/>
                       <a:r>
                         <a:rPr lang="en-US" dirty="0" smtClean="0"/>
-                        <a:t>13.7</a:t>
+                        <a:t>11.3</a:t>
                       </a:r>
                       <a:endParaRPr lang="en-US" dirty="0"/>
                     </a:p>
@@ -7070,7 +7599,7 @@
                       <a:pPr algn="ctr"/>
                       <a:r>
                         <a:rPr lang="en-US" dirty="0" smtClean="0"/>
-                        <a:t>11.1</a:t>
+                        <a:t>8.4</a:t>
                       </a:r>
                       <a:endParaRPr lang="en-US" dirty="0"/>
                     </a:p>
@@ -7090,8 +7619,8 @@
                         <a:t>AlienBee</a:t>
                       </a:r>
                       <a:r>
-                        <a:rPr lang="en-US" b="1" baseline="0" dirty="0" smtClean="0"/>
-                        <a:t> w/ RGBD</a:t>
+                        <a:rPr lang="en-US" b="1" dirty="0" smtClean="0"/>
+                        <a:t> w/ Guidance</a:t>
                       </a:r>
                       <a:endParaRPr lang="en-US" b="1" dirty="0"/>
                     </a:p>
@@ -7106,11 +7635,11 @@
                       <a:pPr algn="ctr"/>
                       <a:r>
                         <a:rPr lang="en-US" dirty="0" smtClean="0"/>
-                        <a:t>1.91</a:t>
+                        <a:t>1.93</a:t>
                       </a:r>
                       <a:r>
                         <a:rPr lang="en-US" baseline="0" dirty="0" smtClean="0"/>
-                        <a:t> (2.36)</a:t>
+                        <a:t> (2.38)</a:t>
                       </a:r>
                       <a:endParaRPr lang="en-US" dirty="0"/>
                     </a:p>
@@ -7125,7 +7654,7 @@
                       <a:pPr algn="ctr"/>
                       <a:r>
                         <a:rPr lang="en-US" dirty="0" smtClean="0"/>
-                        <a:t>11.3</a:t>
+                        <a:t>11.4</a:t>
                       </a:r>
                       <a:endParaRPr lang="en-US" dirty="0"/>
                     </a:p>
@@ -7140,7 +7669,107 @@
                       <a:pPr algn="ctr"/>
                       <a:r>
                         <a:rPr lang="en-US" dirty="0" smtClean="0"/>
-                        <a:t>8.4</a:t>
+                        <a:t>8.5</a:t>
+                      </a:r>
+                      <a:endParaRPr lang="en-US" dirty="0"/>
+                    </a:p>
+                  </a:txBody>
+                  <a:tcPr anchor="ctr"/>
+                </a:tc>
+              </a:tr>
+            </a:tbl>
+          </a:graphicData>
+        </a:graphic>
+      </p:graphicFrame>
+      <p:graphicFrame>
+        <p:nvGraphicFramePr>
+          <p:cNvPr id="10" name="Table 9"/>
+          <p:cNvGraphicFramePr>
+            <a:graphicFrameLocks noGrp="1"/>
+          </p:cNvGraphicFramePr>
+          <p:nvPr>
+            <p:extLst>
+              <p:ext uri="{D42A27DB-BD31-4B8C-83A1-F6EECF244321}">
+                <p14:modId xmlns:p14="http://schemas.microsoft.com/office/powerpoint/2010/main" val="3351763019"/>
+              </p:ext>
+            </p:extLst>
+          </p:nvPr>
+        </p:nvGraphicFramePr>
+        <p:xfrm>
+          <a:off x="1091902" y="4316390"/>
+          <a:ext cx="7203512" cy="1010920"/>
+        </p:xfrm>
+        <a:graphic>
+          <a:graphicData uri="http://schemas.openxmlformats.org/drawingml/2006/table">
+            <a:tbl>
+              <a:tblPr firstRow="1" bandRow="1">
+                <a:tableStyleId>{5C22544A-7EE6-4342-B048-85BDC9FD1C3A}</a:tableStyleId>
+              </a:tblPr>
+              <a:tblGrid>
+                <a:gridCol w="1456640"/>
+                <a:gridCol w="1885278"/>
+                <a:gridCol w="1709057"/>
+                <a:gridCol w="2152537"/>
+              </a:tblGrid>
+              <a:tr h="370840">
+                <a:tc>
+                  <a:txBody>
+                    <a:bodyPr/>
+                    <a:lstStyle/>
+                    <a:p>
+                      <a:pPr algn="ctr"/>
+                      <a:r>
+                        <a:rPr lang="en-US" dirty="0" smtClean="0"/>
+                        <a:t>Time</a:t>
+                      </a:r>
+                      <a:r>
+                        <a:rPr lang="en-US" baseline="0" dirty="0" smtClean="0"/>
+                        <a:t> [min]</a:t>
+                      </a:r>
+                      <a:endParaRPr lang="en-US" dirty="0"/>
+                    </a:p>
+                  </a:txBody>
+                  <a:tcPr anchor="ctr"/>
+                </a:tc>
+                <a:tc>
+                  <a:txBody>
+                    <a:bodyPr/>
+                    <a:lstStyle/>
+                    <a:p>
+                      <a:pPr algn="ctr"/>
+                      <a:r>
+                        <a:rPr lang="en-US" dirty="0" smtClean="0"/>
+                        <a:t>8</a:t>
+                      </a:r>
+                      <a:endParaRPr lang="en-US" dirty="0"/>
+                    </a:p>
+                  </a:txBody>
+                  <a:tcPr anchor="ctr"/>
+                </a:tc>
+                <a:tc>
+                  <a:txBody>
+                    <a:bodyPr/>
+                    <a:lstStyle/>
+                    <a:p>
+                      <a:pPr algn="ctr"/>
+                      <a:r>
+                        <a:rPr lang="en-US" dirty="0" smtClean="0"/>
+                        <a:t>10</a:t>
+                      </a:r>
+                      <a:endParaRPr lang="en-US" dirty="0"/>
+                    </a:p>
+                  </a:txBody>
+                  <a:tcPr anchor="ctr"/>
+                </a:tc>
+                <a:tc>
+                  <a:txBody>
+                    <a:bodyPr/>
+                    <a:lstStyle/>
+                    <a:p>
+                      <a:pPr algn="ctr"/>
+                      <a:r>
+                        <a:rPr lang="en-US" baseline="0" dirty="0" smtClean="0"/>
+                        <a:t>11</a:t>
                       </a:r>
                       <a:endParaRPr lang="en-US" dirty="0"/>
                     </a:p>
@@ -7156,12 +7785,12 @@
                     <a:p>
                       <a:pPr algn="ctr"/>
                       <a:r>
-                        <a:rPr lang="en-US" b="1" dirty="0" err="1" smtClean="0"/>
-                        <a:t>AlienBee</a:t>
-                      </a:r>
-                      <a:r>
                         <a:rPr lang="en-US" b="1" dirty="0" smtClean="0"/>
-                        <a:t> w/ Guidance</a:t>
+                        <a:t>Min</a:t>
+                      </a:r>
+                      <a:r>
+                        <a:rPr lang="en-US" b="1" baseline="0" dirty="0" smtClean="0"/>
+                        <a:t> Speed [m/s]</a:t>
                       </a:r>
                       <a:endParaRPr lang="en-US" b="1" dirty="0"/>
                     </a:p>
@@ -7176,11 +7805,7 @@
                       <a:pPr algn="ctr"/>
                       <a:r>
                         <a:rPr lang="en-US" dirty="0" smtClean="0"/>
-                        <a:t>1.93</a:t>
-                      </a:r>
-                      <a:r>
-                        <a:rPr lang="en-US" baseline="0" dirty="0" smtClean="0"/>
-                        <a:t> (2.38)</a:t>
+                        <a:t>2.31</a:t>
                       </a:r>
                       <a:endParaRPr lang="en-US" dirty="0"/>
                     </a:p>
@@ -7195,7 +7820,7 @@
                       <a:pPr algn="ctr"/>
                       <a:r>
                         <a:rPr lang="en-US" dirty="0" smtClean="0"/>
-                        <a:t>11.4</a:t>
+                        <a:t>1.85</a:t>
                       </a:r>
                       <a:endParaRPr lang="en-US" dirty="0"/>
                     </a:p>
@@ -7210,7 +7835,7 @@
                       <a:pPr algn="ctr"/>
                       <a:r>
                         <a:rPr lang="en-US" dirty="0" smtClean="0"/>
-                        <a:t>8.5</a:t>
+                        <a:t>1.67</a:t>
                       </a:r>
                       <a:endParaRPr lang="en-US" dirty="0"/>
                     </a:p>
@@ -7242,7 +7867,7 @@
 </p:sld>
 </file>
 
-<file path=ppt/slides/slide5.xml><?xml version="1.0" encoding="utf-8"?>
+<file path=ppt/slides/slide6.xml><?xml version="1.0" encoding="utf-8"?>
 <p:sld xmlns:a="http://schemas.openxmlformats.org/drawingml/2006/main" xmlns:r="http://schemas.openxmlformats.org/officeDocument/2006/relationships" xmlns:p="http://schemas.openxmlformats.org/presentationml/2006/main">
   <p:cSld>
     <p:spTree>
@@ -8280,7 +8905,7 @@
 </p:sld>
 </file>
 
-<file path=ppt/slides/slide6.xml><?xml version="1.0" encoding="utf-8"?>
+<file path=ppt/slides/slide7.xml><?xml version="1.0" encoding="utf-8"?>
 <p:sld xmlns:a="http://schemas.openxmlformats.org/drawingml/2006/main" xmlns:r="http://schemas.openxmlformats.org/officeDocument/2006/relationships" xmlns:p="http://schemas.openxmlformats.org/presentationml/2006/main">
   <p:cSld>
     <p:spTree>
@@ -8492,8 +9117,8 @@
           </p:txBody>
         </p:sp>
       </p:grpSp>
-      <mc:AlternateContent xmlns:mc="http://schemas.openxmlformats.org/markup-compatibility/2006">
-        <mc:Choice xmlns:a14="http://schemas.microsoft.com/office/drawing/2010/main" Requires="a14">
+      <mc:AlternateContent xmlns:mc="http://schemas.openxmlformats.org/markup-compatibility/2006" xmlns:a14="http://schemas.microsoft.com/office/drawing/2010/main">
+        <mc:Choice Requires="a14">
           <p:sp>
             <p:nvSpPr>
               <p:cNvPr id="3" name="TextBox 2"/>
@@ -8923,7 +9548,7 @@
             </p:txBody>
           </p:sp>
         </mc:Choice>
-        <mc:Fallback>
+        <mc:Fallback xmlns="">
           <p:sp>
             <p:nvSpPr>
               <p:cNvPr id="3" name="TextBox 2"/>
@@ -9523,8 +10148,8 @@
           </a:fontRef>
         </p:style>
       </p:cxnSp>
-      <mc:AlternateContent xmlns:mc="http://schemas.openxmlformats.org/markup-compatibility/2006">
-        <mc:Choice xmlns:a14="http://schemas.microsoft.com/office/drawing/2010/main" Requires="a14">
+      <mc:AlternateContent xmlns:mc="http://schemas.openxmlformats.org/markup-compatibility/2006" xmlns:a14="http://schemas.microsoft.com/office/drawing/2010/main">
+        <mc:Choice Requires="a14">
           <p:sp>
             <p:nvSpPr>
               <p:cNvPr id="28" name="TextBox 27"/>
@@ -9547,6 +10172,7 @@
               </a:bodyPr>
               <a:lstStyle/>
               <a:p>
+                <a:pPr/>
                 <a14:m>
                   <m:oMathPara xmlns:m="http://schemas.openxmlformats.org/officeDocument/2006/math">
                     <m:oMathParaPr>
@@ -9567,7 +10193,7 @@
             </p:txBody>
           </p:sp>
         </mc:Choice>
-        <mc:Fallback>
+        <mc:Fallback xmlns="">
           <p:sp>
             <p:nvSpPr>
               <p:cNvPr id="28" name="TextBox 27"/>

</xml_diff>